<commit_message>
Newer versions of ontwerp process
</commit_message>
<xml_diff>
--- a/assets/tools/2020-05-09-MakersPassport/Hulp_OntwerpProcess.pptx
+++ b/assets/tools/2020-05-09-MakersPassport/Hulp_OntwerpProcess.pptx
@@ -2,27 +2,41 @@
 <file path=ppt/presentation.xml><?xml version="1.0" encoding="utf-8"?>
 <p:presentation xmlns:a="http://schemas.openxmlformats.org/drawingml/2006/main" xmlns:r="http://schemas.openxmlformats.org/officeDocument/2006/relationships" xmlns:mc="http://schemas.openxmlformats.org/markup-compatibility/2006" xmlns:mv="urn:schemas-microsoft-com:mac:vml" xmlns:p="http://schemas.openxmlformats.org/presentationml/2006/main" xmlns:c="http://schemas.openxmlformats.org/drawingml/2006/chart" xmlns:dgm="http://schemas.openxmlformats.org/drawingml/2006/diagram" xmlns:o="urn:schemas-microsoft-com:office:office" xmlns:v="urn:schemas-microsoft-com:vml" xmlns:pvml="urn:schemas-microsoft-com:office:powerpoint" xmlns:com="http://schemas.openxmlformats.org/drawingml/2006/compatibility" xmlns:p14="http://schemas.microsoft.com/office/powerpoint/2010/main" xmlns:p15="http://schemas.microsoft.com/office/powerpoint/2012/main" autoCompressPictures="0" embedTrueTypeFonts="1" strictFirstAndLastChars="0" saveSubsetFonts="1">
   <p:sldMasterIdLst>
-    <p:sldMasterId id="2147483659" r:id="rId4"/>
+    <p:sldMasterId id="2147483659" r:id="rId5"/>
   </p:sldMasterIdLst>
   <p:notesMasterIdLst>
-    <p:notesMasterId r:id="rId5"/>
+    <p:notesMasterId r:id="rId6"/>
   </p:notesMasterIdLst>
   <p:sldIdLst>
-    <p:sldId id="256" r:id="rId6"/>
-    <p:sldId id="257" r:id="rId7"/>
-    <p:sldId id="258" r:id="rId8"/>
-    <p:sldId id="259" r:id="rId9"/>
-    <p:sldId id="260" r:id="rId10"/>
+    <p:sldId id="256" r:id="rId7"/>
+    <p:sldId id="257" r:id="rId8"/>
+    <p:sldId id="258" r:id="rId9"/>
+    <p:sldId id="259" r:id="rId10"/>
+    <p:sldId id="260" r:id="rId11"/>
+    <p:sldId id="261" r:id="rId12"/>
+    <p:sldId id="262" r:id="rId13"/>
+    <p:sldId id="263" r:id="rId14"/>
+    <p:sldId id="264" r:id="rId15"/>
+    <p:sldId id="265" r:id="rId16"/>
+    <p:sldId id="266" r:id="rId17"/>
+    <p:sldId id="267" r:id="rId18"/>
   </p:sldIdLst>
   <p:sldSz cy="10691800" cx="7559675"/>
   <p:notesSz cx="6858000" cy="9945675"/>
   <p:embeddedFontLst>
     <p:embeddedFont>
       <p:font typeface="Ubuntu"/>
-      <p:regular r:id="rId11"/>
-      <p:bold r:id="rId12"/>
-      <p:italic r:id="rId13"/>
-      <p:boldItalic r:id="rId14"/>
+      <p:regular r:id="rId19"/>
+      <p:bold r:id="rId20"/>
+      <p:italic r:id="rId21"/>
+      <p:boldItalic r:id="rId22"/>
+    </p:embeddedFont>
+    <p:embeddedFont>
+      <p:font typeface="Cabin"/>
+      <p:regular r:id="rId23"/>
+      <p:bold r:id="rId24"/>
+      <p:italic r:id="rId25"/>
+      <p:boldItalic r:id="rId26"/>
     </p:embeddedFont>
   </p:embeddedFontLst>
   <p:defaultTextStyle>
@@ -738,7 +752,601 @@
       </p:grpSpPr>
       <p:sp>
         <p:nvSpPr>
-          <p:cNvPr id="81" name="Google Shape;81;p1:notes"/>
+          <p:cNvPr id="81" name="Google Shape;81;g87b2d08c9d_0_0:notes"/>
+          <p:cNvSpPr/>
+          <p:nvPr>
+            <p:ph idx="2" type="sldImg"/>
+          </p:nvPr>
+        </p:nvSpPr>
+        <p:spPr>
+          <a:xfrm>
+            <a:off x="1143225" y="745925"/>
+            <a:ext cx="4572300" cy="3729600"/>
+          </a:xfrm>
+          <a:custGeom>
+            <a:rect b="b" l="l" r="r" t="t"/>
+            <a:pathLst>
+              <a:path extrusionOk="0" h="120000" w="120000">
+                <a:moveTo>
+                  <a:pt x="0" y="0"/>
+                </a:moveTo>
+                <a:lnTo>
+                  <a:pt x="120000" y="0"/>
+                </a:lnTo>
+                <a:lnTo>
+                  <a:pt x="120000" y="120000"/>
+                </a:lnTo>
+                <a:lnTo>
+                  <a:pt x="0" y="120000"/>
+                </a:lnTo>
+                <a:close/>
+              </a:path>
+            </a:pathLst>
+          </a:custGeom>
+        </p:spPr>
+      </p:sp>
+      <p:sp>
+        <p:nvSpPr>
+          <p:cNvPr id="82" name="Google Shape;82;g87b2d08c9d_0_0:notes"/>
+          <p:cNvSpPr txBox="1"/>
+          <p:nvPr>
+            <p:ph idx="1" type="body"/>
+          </p:nvPr>
+        </p:nvSpPr>
+        <p:spPr>
+          <a:xfrm>
+            <a:off x="685800" y="4724175"/>
+            <a:ext cx="5486400" cy="4475700"/>
+          </a:xfrm>
+          <a:prstGeom prst="rect">
+            <a:avLst/>
+          </a:prstGeom>
+        </p:spPr>
+        <p:txBody>
+          <a:bodyPr anchorCtr="0" anchor="t" bIns="91425" lIns="91425" spcFirstLastPara="1" rIns="91425" wrap="square" tIns="91425">
+            <a:noAutofit/>
+          </a:bodyPr>
+          <a:lstStyle/>
+          <a:p>
+            <a:pPr indent="0" lvl="0" marL="0" rtl="0" algn="l">
+              <a:spcBef>
+                <a:spcPts val="0"/>
+              </a:spcBef>
+              <a:spcAft>
+                <a:spcPts val="0"/>
+              </a:spcAft>
+              <a:buNone/>
+            </a:pPr>
+            <a:r>
+              <a:t/>
+            </a:r>
+            <a:endParaRPr/>
+          </a:p>
+        </p:txBody>
+      </p:sp>
+    </p:spTree>
+  </p:cSld>
+  <p:clrMapOvr>
+    <a:masterClrMapping/>
+  </p:clrMapOvr>
+</p:notes>
+</file>
+
+<file path=ppt/notesSlides/notesSlide10.xml><?xml version="1.0" encoding="utf-8"?>
+<p:notes xmlns:a="http://schemas.openxmlformats.org/drawingml/2006/main" xmlns:r="http://schemas.openxmlformats.org/officeDocument/2006/relationships" xmlns:mc="http://schemas.openxmlformats.org/markup-compatibility/2006" xmlns:mv="urn:schemas-microsoft-com:mac:vml" xmlns:p="http://schemas.openxmlformats.org/presentationml/2006/main" xmlns:c="http://schemas.openxmlformats.org/drawingml/2006/chart" xmlns:dgm="http://schemas.openxmlformats.org/drawingml/2006/diagram" xmlns:o="urn:schemas-microsoft-com:office:office" xmlns:v="urn:schemas-microsoft-com:vml" xmlns:pvml="urn:schemas-microsoft-com:office:powerpoint" xmlns:com="http://schemas.openxmlformats.org/drawingml/2006/compatibility" xmlns:p14="http://schemas.microsoft.com/office/powerpoint/2010/main" xmlns:p15="http://schemas.microsoft.com/office/powerpoint/2012/main" showMasterPhAnim="0" showMasterSp="0">
+  <p:cSld>
+    <p:spTree>
+      <p:nvGrpSpPr>
+        <p:cNvPr id="185" name="Shape 185"/>
+        <p:cNvGrpSpPr/>
+        <p:nvPr/>
+      </p:nvGrpSpPr>
+      <p:grpSpPr>
+        <a:xfrm>
+          <a:off x="0" y="0"/>
+          <a:ext cx="0" cy="0"/>
+          <a:chOff x="0" y="0"/>
+          <a:chExt cx="0" cy="0"/>
+        </a:xfrm>
+      </p:grpSpPr>
+      <p:sp>
+        <p:nvSpPr>
+          <p:cNvPr id="186" name="Google Shape;186;g87b2d08c9d_0_34:notes"/>
+          <p:cNvSpPr/>
+          <p:nvPr>
+            <p:ph idx="2" type="sldImg"/>
+          </p:nvPr>
+        </p:nvSpPr>
+        <p:spPr>
+          <a:xfrm>
+            <a:off x="1143225" y="745925"/>
+            <a:ext cx="4572300" cy="3729600"/>
+          </a:xfrm>
+          <a:custGeom>
+            <a:rect b="b" l="l" r="r" t="t"/>
+            <a:pathLst>
+              <a:path extrusionOk="0" h="120000" w="120000">
+                <a:moveTo>
+                  <a:pt x="0" y="0"/>
+                </a:moveTo>
+                <a:lnTo>
+                  <a:pt x="120000" y="0"/>
+                </a:lnTo>
+                <a:lnTo>
+                  <a:pt x="120000" y="120000"/>
+                </a:lnTo>
+                <a:lnTo>
+                  <a:pt x="0" y="120000"/>
+                </a:lnTo>
+                <a:close/>
+              </a:path>
+            </a:pathLst>
+          </a:custGeom>
+        </p:spPr>
+      </p:sp>
+      <p:sp>
+        <p:nvSpPr>
+          <p:cNvPr id="187" name="Google Shape;187;g87b2d08c9d_0_34:notes"/>
+          <p:cNvSpPr txBox="1"/>
+          <p:nvPr>
+            <p:ph idx="1" type="body"/>
+          </p:nvPr>
+        </p:nvSpPr>
+        <p:spPr>
+          <a:xfrm>
+            <a:off x="685800" y="4724175"/>
+            <a:ext cx="5486400" cy="4475700"/>
+          </a:xfrm>
+          <a:prstGeom prst="rect">
+            <a:avLst/>
+          </a:prstGeom>
+        </p:spPr>
+        <p:txBody>
+          <a:bodyPr anchorCtr="0" anchor="t" bIns="91425" lIns="91425" spcFirstLastPara="1" rIns="91425" wrap="square" tIns="91425">
+            <a:noAutofit/>
+          </a:bodyPr>
+          <a:lstStyle/>
+          <a:p>
+            <a:pPr indent="0" lvl="0" marL="0" rtl="0" algn="l">
+              <a:spcBef>
+                <a:spcPts val="0"/>
+              </a:spcBef>
+              <a:spcAft>
+                <a:spcPts val="0"/>
+              </a:spcAft>
+              <a:buNone/>
+            </a:pPr>
+            <a:r>
+              <a:t/>
+            </a:r>
+            <a:endParaRPr/>
+          </a:p>
+        </p:txBody>
+      </p:sp>
+    </p:spTree>
+  </p:cSld>
+  <p:clrMapOvr>
+    <a:masterClrMapping/>
+  </p:clrMapOvr>
+</p:notes>
+</file>
+
+<file path=ppt/notesSlides/notesSlide11.xml><?xml version="1.0" encoding="utf-8"?>
+<p:notes xmlns:a="http://schemas.openxmlformats.org/drawingml/2006/main" xmlns:r="http://schemas.openxmlformats.org/officeDocument/2006/relationships" xmlns:mc="http://schemas.openxmlformats.org/markup-compatibility/2006" xmlns:mv="urn:schemas-microsoft-com:mac:vml" xmlns:p="http://schemas.openxmlformats.org/presentationml/2006/main" xmlns:c="http://schemas.openxmlformats.org/drawingml/2006/chart" xmlns:dgm="http://schemas.openxmlformats.org/drawingml/2006/diagram" xmlns:o="urn:schemas-microsoft-com:office:office" xmlns:v="urn:schemas-microsoft-com:vml" xmlns:pvml="urn:schemas-microsoft-com:office:powerpoint" xmlns:com="http://schemas.openxmlformats.org/drawingml/2006/compatibility" xmlns:p14="http://schemas.microsoft.com/office/powerpoint/2010/main" xmlns:p15="http://schemas.microsoft.com/office/powerpoint/2012/main" showMasterPhAnim="0" showMasterSp="0">
+  <p:cSld>
+    <p:spTree>
+      <p:nvGrpSpPr>
+        <p:cNvPr id="194" name="Shape 194"/>
+        <p:cNvGrpSpPr/>
+        <p:nvPr/>
+      </p:nvGrpSpPr>
+      <p:grpSpPr>
+        <a:xfrm>
+          <a:off x="0" y="0"/>
+          <a:ext cx="0" cy="0"/>
+          <a:chOff x="0" y="0"/>
+          <a:chExt cx="0" cy="0"/>
+        </a:xfrm>
+      </p:grpSpPr>
+      <p:sp>
+        <p:nvSpPr>
+          <p:cNvPr id="195" name="Google Shape;195;g87b2d08c9d_0_56:notes"/>
+          <p:cNvSpPr/>
+          <p:nvPr>
+            <p:ph idx="2" type="sldImg"/>
+          </p:nvPr>
+        </p:nvSpPr>
+        <p:spPr>
+          <a:xfrm>
+            <a:off x="1143225" y="745925"/>
+            <a:ext cx="4572300" cy="3729600"/>
+          </a:xfrm>
+          <a:custGeom>
+            <a:rect b="b" l="l" r="r" t="t"/>
+            <a:pathLst>
+              <a:path extrusionOk="0" h="120000" w="120000">
+                <a:moveTo>
+                  <a:pt x="0" y="0"/>
+                </a:moveTo>
+                <a:lnTo>
+                  <a:pt x="120000" y="0"/>
+                </a:lnTo>
+                <a:lnTo>
+                  <a:pt x="120000" y="120000"/>
+                </a:lnTo>
+                <a:lnTo>
+                  <a:pt x="0" y="120000"/>
+                </a:lnTo>
+                <a:close/>
+              </a:path>
+            </a:pathLst>
+          </a:custGeom>
+        </p:spPr>
+      </p:sp>
+      <p:sp>
+        <p:nvSpPr>
+          <p:cNvPr id="196" name="Google Shape;196;g87b2d08c9d_0_56:notes"/>
+          <p:cNvSpPr txBox="1"/>
+          <p:nvPr>
+            <p:ph idx="1" type="body"/>
+          </p:nvPr>
+        </p:nvSpPr>
+        <p:spPr>
+          <a:xfrm>
+            <a:off x="685800" y="4724175"/>
+            <a:ext cx="5486400" cy="4475700"/>
+          </a:xfrm>
+          <a:prstGeom prst="rect">
+            <a:avLst/>
+          </a:prstGeom>
+        </p:spPr>
+        <p:txBody>
+          <a:bodyPr anchorCtr="0" anchor="t" bIns="91425" lIns="91425" spcFirstLastPara="1" rIns="91425" wrap="square" tIns="91425">
+            <a:noAutofit/>
+          </a:bodyPr>
+          <a:lstStyle/>
+          <a:p>
+            <a:pPr indent="0" lvl="0" marL="0" rtl="0" algn="l">
+              <a:spcBef>
+                <a:spcPts val="0"/>
+              </a:spcBef>
+              <a:spcAft>
+                <a:spcPts val="0"/>
+              </a:spcAft>
+              <a:buNone/>
+            </a:pPr>
+            <a:r>
+              <a:t/>
+            </a:r>
+            <a:endParaRPr/>
+          </a:p>
+        </p:txBody>
+      </p:sp>
+    </p:spTree>
+  </p:cSld>
+  <p:clrMapOvr>
+    <a:masterClrMapping/>
+  </p:clrMapOvr>
+</p:notes>
+</file>
+
+<file path=ppt/notesSlides/notesSlide12.xml><?xml version="1.0" encoding="utf-8"?>
+<p:notes xmlns:a="http://schemas.openxmlformats.org/drawingml/2006/main" xmlns:r="http://schemas.openxmlformats.org/officeDocument/2006/relationships" xmlns:mc="http://schemas.openxmlformats.org/markup-compatibility/2006" xmlns:mv="urn:schemas-microsoft-com:mac:vml" xmlns:p="http://schemas.openxmlformats.org/presentationml/2006/main" xmlns:c="http://schemas.openxmlformats.org/drawingml/2006/chart" xmlns:dgm="http://schemas.openxmlformats.org/drawingml/2006/diagram" xmlns:o="urn:schemas-microsoft-com:office:office" xmlns:v="urn:schemas-microsoft-com:vml" xmlns:pvml="urn:schemas-microsoft-com:office:powerpoint" xmlns:com="http://schemas.openxmlformats.org/drawingml/2006/compatibility" xmlns:p14="http://schemas.microsoft.com/office/powerpoint/2010/main" xmlns:p15="http://schemas.microsoft.com/office/powerpoint/2012/main" showMasterPhAnim="0" showMasterSp="0">
+  <p:cSld>
+    <p:spTree>
+      <p:nvGrpSpPr>
+        <p:cNvPr id="206" name="Shape 206"/>
+        <p:cNvGrpSpPr/>
+        <p:nvPr/>
+      </p:nvGrpSpPr>
+      <p:grpSpPr>
+        <a:xfrm>
+          <a:off x="0" y="0"/>
+          <a:ext cx="0" cy="0"/>
+          <a:chOff x="0" y="0"/>
+          <a:chExt cx="0" cy="0"/>
+        </a:xfrm>
+      </p:grpSpPr>
+      <p:sp>
+        <p:nvSpPr>
+          <p:cNvPr id="207" name="Google Shape;207;g87b2d08c9d_0_82:notes"/>
+          <p:cNvSpPr/>
+          <p:nvPr>
+            <p:ph idx="2" type="sldImg"/>
+          </p:nvPr>
+        </p:nvSpPr>
+        <p:spPr>
+          <a:xfrm>
+            <a:off x="1143225" y="745925"/>
+            <a:ext cx="4572300" cy="3729600"/>
+          </a:xfrm>
+          <a:custGeom>
+            <a:rect b="b" l="l" r="r" t="t"/>
+            <a:pathLst>
+              <a:path extrusionOk="0" h="120000" w="120000">
+                <a:moveTo>
+                  <a:pt x="0" y="0"/>
+                </a:moveTo>
+                <a:lnTo>
+                  <a:pt x="120000" y="0"/>
+                </a:lnTo>
+                <a:lnTo>
+                  <a:pt x="120000" y="120000"/>
+                </a:lnTo>
+                <a:lnTo>
+                  <a:pt x="0" y="120000"/>
+                </a:lnTo>
+                <a:close/>
+              </a:path>
+            </a:pathLst>
+          </a:custGeom>
+        </p:spPr>
+      </p:sp>
+      <p:sp>
+        <p:nvSpPr>
+          <p:cNvPr id="208" name="Google Shape;208;g87b2d08c9d_0_82:notes"/>
+          <p:cNvSpPr txBox="1"/>
+          <p:nvPr>
+            <p:ph idx="1" type="body"/>
+          </p:nvPr>
+        </p:nvSpPr>
+        <p:spPr>
+          <a:xfrm>
+            <a:off x="685800" y="4724175"/>
+            <a:ext cx="5486400" cy="4475700"/>
+          </a:xfrm>
+          <a:prstGeom prst="rect">
+            <a:avLst/>
+          </a:prstGeom>
+        </p:spPr>
+        <p:txBody>
+          <a:bodyPr anchorCtr="0" anchor="t" bIns="91425" lIns="91425" spcFirstLastPara="1" rIns="91425" wrap="square" tIns="91425">
+            <a:noAutofit/>
+          </a:bodyPr>
+          <a:lstStyle/>
+          <a:p>
+            <a:pPr indent="0" lvl="0" marL="0" rtl="0" algn="l">
+              <a:spcBef>
+                <a:spcPts val="0"/>
+              </a:spcBef>
+              <a:spcAft>
+                <a:spcPts val="0"/>
+              </a:spcAft>
+              <a:buNone/>
+            </a:pPr>
+            <a:r>
+              <a:t/>
+            </a:r>
+            <a:endParaRPr/>
+          </a:p>
+        </p:txBody>
+      </p:sp>
+    </p:spTree>
+  </p:cSld>
+  <p:clrMapOvr>
+    <a:masterClrMapping/>
+  </p:clrMapOvr>
+</p:notes>
+</file>
+
+<file path=ppt/notesSlides/notesSlide2.xml><?xml version="1.0" encoding="utf-8"?>
+<p:notes xmlns:a="http://schemas.openxmlformats.org/drawingml/2006/main" xmlns:r="http://schemas.openxmlformats.org/officeDocument/2006/relationships" xmlns:mc="http://schemas.openxmlformats.org/markup-compatibility/2006" xmlns:mv="urn:schemas-microsoft-com:mac:vml" xmlns:p="http://schemas.openxmlformats.org/presentationml/2006/main" xmlns:c="http://schemas.openxmlformats.org/drawingml/2006/chart" xmlns:dgm="http://schemas.openxmlformats.org/drawingml/2006/diagram" xmlns:o="urn:schemas-microsoft-com:office:office" xmlns:v="urn:schemas-microsoft-com:vml" xmlns:pvml="urn:schemas-microsoft-com:office:powerpoint" xmlns:com="http://schemas.openxmlformats.org/drawingml/2006/compatibility" xmlns:p14="http://schemas.microsoft.com/office/powerpoint/2010/main" xmlns:p15="http://schemas.microsoft.com/office/powerpoint/2012/main" showMasterPhAnim="0" showMasterSp="0">
+  <p:cSld>
+    <p:spTree>
+      <p:nvGrpSpPr>
+        <p:cNvPr id="89" name="Shape 89"/>
+        <p:cNvGrpSpPr/>
+        <p:nvPr/>
+      </p:nvGrpSpPr>
+      <p:grpSpPr>
+        <a:xfrm>
+          <a:off x="0" y="0"/>
+          <a:ext cx="0" cy="0"/>
+          <a:chOff x="0" y="0"/>
+          <a:chExt cx="0" cy="0"/>
+        </a:xfrm>
+      </p:grpSpPr>
+      <p:sp>
+        <p:nvSpPr>
+          <p:cNvPr id="90" name="Google Shape;90;g87b2d08c9d_0_77:notes"/>
+          <p:cNvSpPr/>
+          <p:nvPr>
+            <p:ph idx="2" type="sldImg"/>
+          </p:nvPr>
+        </p:nvSpPr>
+        <p:spPr>
+          <a:xfrm>
+            <a:off x="1143225" y="745925"/>
+            <a:ext cx="4572300" cy="3729600"/>
+          </a:xfrm>
+          <a:custGeom>
+            <a:rect b="b" l="l" r="r" t="t"/>
+            <a:pathLst>
+              <a:path extrusionOk="0" h="120000" w="120000">
+                <a:moveTo>
+                  <a:pt x="0" y="0"/>
+                </a:moveTo>
+                <a:lnTo>
+                  <a:pt x="120000" y="0"/>
+                </a:lnTo>
+                <a:lnTo>
+                  <a:pt x="120000" y="120000"/>
+                </a:lnTo>
+                <a:lnTo>
+                  <a:pt x="0" y="120000"/>
+                </a:lnTo>
+                <a:close/>
+              </a:path>
+            </a:pathLst>
+          </a:custGeom>
+        </p:spPr>
+      </p:sp>
+      <p:sp>
+        <p:nvSpPr>
+          <p:cNvPr id="91" name="Google Shape;91;g87b2d08c9d_0_77:notes"/>
+          <p:cNvSpPr txBox="1"/>
+          <p:nvPr>
+            <p:ph idx="1" type="body"/>
+          </p:nvPr>
+        </p:nvSpPr>
+        <p:spPr>
+          <a:xfrm>
+            <a:off x="685800" y="4724175"/>
+            <a:ext cx="5486400" cy="4475700"/>
+          </a:xfrm>
+          <a:prstGeom prst="rect">
+            <a:avLst/>
+          </a:prstGeom>
+        </p:spPr>
+        <p:txBody>
+          <a:bodyPr anchorCtr="0" anchor="t" bIns="91425" lIns="91425" spcFirstLastPara="1" rIns="91425" wrap="square" tIns="91425">
+            <a:noAutofit/>
+          </a:bodyPr>
+          <a:lstStyle/>
+          <a:p>
+            <a:pPr indent="0" lvl="0" marL="0" rtl="0" algn="l">
+              <a:spcBef>
+                <a:spcPts val="0"/>
+              </a:spcBef>
+              <a:spcAft>
+                <a:spcPts val="0"/>
+              </a:spcAft>
+              <a:buNone/>
+            </a:pPr>
+            <a:r>
+              <a:t/>
+            </a:r>
+            <a:endParaRPr/>
+          </a:p>
+        </p:txBody>
+      </p:sp>
+    </p:spTree>
+  </p:cSld>
+  <p:clrMapOvr>
+    <a:masterClrMapping/>
+  </p:clrMapOvr>
+</p:notes>
+</file>
+
+<file path=ppt/notesSlides/notesSlide3.xml><?xml version="1.0" encoding="utf-8"?>
+<p:notes xmlns:a="http://schemas.openxmlformats.org/drawingml/2006/main" xmlns:r="http://schemas.openxmlformats.org/officeDocument/2006/relationships" xmlns:mc="http://schemas.openxmlformats.org/markup-compatibility/2006" xmlns:mv="urn:schemas-microsoft-com:mac:vml" xmlns:p="http://schemas.openxmlformats.org/presentationml/2006/main" xmlns:c="http://schemas.openxmlformats.org/drawingml/2006/chart" xmlns:dgm="http://schemas.openxmlformats.org/drawingml/2006/diagram" xmlns:o="urn:schemas-microsoft-com:office:office" xmlns:v="urn:schemas-microsoft-com:vml" xmlns:pvml="urn:schemas-microsoft-com:office:powerpoint" xmlns:com="http://schemas.openxmlformats.org/drawingml/2006/compatibility" xmlns:p14="http://schemas.microsoft.com/office/powerpoint/2010/main" xmlns:p15="http://schemas.microsoft.com/office/powerpoint/2012/main" showMasterPhAnim="0" showMasterSp="0">
+  <p:cSld>
+    <p:spTree>
+      <p:nvGrpSpPr>
+        <p:cNvPr id="94" name="Shape 94"/>
+        <p:cNvGrpSpPr/>
+        <p:nvPr/>
+      </p:nvGrpSpPr>
+      <p:grpSpPr>
+        <a:xfrm>
+          <a:off x="0" y="0"/>
+          <a:ext cx="0" cy="0"/>
+          <a:chOff x="0" y="0"/>
+          <a:chExt cx="0" cy="0"/>
+        </a:xfrm>
+      </p:grpSpPr>
+      <p:sp>
+        <p:nvSpPr>
+          <p:cNvPr id="95" name="Google Shape;95;g8499586f39_0_120:notes"/>
+          <p:cNvSpPr/>
+          <p:nvPr>
+            <p:ph idx="2" type="sldImg"/>
+          </p:nvPr>
+        </p:nvSpPr>
+        <p:spPr>
+          <a:xfrm>
+            <a:off x="1143225" y="745925"/>
+            <a:ext cx="4572300" cy="3729600"/>
+          </a:xfrm>
+          <a:custGeom>
+            <a:rect b="b" l="l" r="r" t="t"/>
+            <a:pathLst>
+              <a:path extrusionOk="0" h="120000" w="120000">
+                <a:moveTo>
+                  <a:pt x="0" y="0"/>
+                </a:moveTo>
+                <a:lnTo>
+                  <a:pt x="120000" y="0"/>
+                </a:lnTo>
+                <a:lnTo>
+                  <a:pt x="120000" y="120000"/>
+                </a:lnTo>
+                <a:lnTo>
+                  <a:pt x="0" y="120000"/>
+                </a:lnTo>
+                <a:close/>
+              </a:path>
+            </a:pathLst>
+          </a:custGeom>
+        </p:spPr>
+      </p:sp>
+      <p:sp>
+        <p:nvSpPr>
+          <p:cNvPr id="96" name="Google Shape;96;g8499586f39_0_120:notes"/>
+          <p:cNvSpPr txBox="1"/>
+          <p:nvPr>
+            <p:ph idx="1" type="body"/>
+          </p:nvPr>
+        </p:nvSpPr>
+        <p:spPr>
+          <a:xfrm>
+            <a:off x="685800" y="4724175"/>
+            <a:ext cx="5486400" cy="4475700"/>
+          </a:xfrm>
+          <a:prstGeom prst="rect">
+            <a:avLst/>
+          </a:prstGeom>
+        </p:spPr>
+        <p:txBody>
+          <a:bodyPr anchorCtr="0" anchor="t" bIns="91425" lIns="91425" spcFirstLastPara="1" rIns="91425" wrap="square" tIns="91425">
+            <a:noAutofit/>
+          </a:bodyPr>
+          <a:lstStyle/>
+          <a:p>
+            <a:pPr indent="0" lvl="0" marL="0" rtl="0" algn="l">
+              <a:spcBef>
+                <a:spcPts val="0"/>
+              </a:spcBef>
+              <a:spcAft>
+                <a:spcPts val="0"/>
+              </a:spcAft>
+              <a:buNone/>
+            </a:pPr>
+            <a:r>
+              <a:t/>
+            </a:r>
+            <a:endParaRPr/>
+          </a:p>
+        </p:txBody>
+      </p:sp>
+    </p:spTree>
+  </p:cSld>
+  <p:clrMapOvr>
+    <a:masterClrMapping/>
+  </p:clrMapOvr>
+</p:notes>
+</file>
+
+<file path=ppt/notesSlides/notesSlide4.xml><?xml version="1.0" encoding="utf-8"?>
+<p:notes xmlns:a="http://schemas.openxmlformats.org/drawingml/2006/main" xmlns:r="http://schemas.openxmlformats.org/officeDocument/2006/relationships" xmlns:mc="http://schemas.openxmlformats.org/markup-compatibility/2006" xmlns:mv="urn:schemas-microsoft-com:mac:vml" xmlns:p="http://schemas.openxmlformats.org/presentationml/2006/main" xmlns:c="http://schemas.openxmlformats.org/drawingml/2006/chart" xmlns:dgm="http://schemas.openxmlformats.org/drawingml/2006/diagram" xmlns:o="urn:schemas-microsoft-com:office:office" xmlns:v="urn:schemas-microsoft-com:vml" xmlns:pvml="urn:schemas-microsoft-com:office:powerpoint" xmlns:com="http://schemas.openxmlformats.org/drawingml/2006/compatibility" xmlns:p14="http://schemas.microsoft.com/office/powerpoint/2010/main" xmlns:p15="http://schemas.microsoft.com/office/powerpoint/2012/main" showMasterPhAnim="0" showMasterSp="0">
+  <p:cSld>
+    <p:spTree>
+      <p:nvGrpSpPr>
+        <p:cNvPr id="100" name="Shape 100"/>
+        <p:cNvGrpSpPr/>
+        <p:nvPr/>
+      </p:nvGrpSpPr>
+      <p:grpSpPr>
+        <a:xfrm>
+          <a:off x="0" y="0"/>
+          <a:ext cx="0" cy="0"/>
+          <a:chOff x="0" y="0"/>
+          <a:chExt cx="0" cy="0"/>
+        </a:xfrm>
+      </p:grpSpPr>
+      <p:sp>
+        <p:nvSpPr>
+          <p:cNvPr id="101" name="Google Shape;101;p1:notes"/>
           <p:cNvSpPr txBox="1"/>
           <p:nvPr>
             <p:ph idx="1" type="body"/>
@@ -777,7 +1385,7 @@
       </p:sp>
       <p:sp>
         <p:nvSpPr>
-          <p:cNvPr id="82" name="Google Shape;82;p1:notes"/>
+          <p:cNvPr id="102" name="Google Shape;102;p1:notes"/>
           <p:cNvSpPr/>
           <p:nvPr>
             <p:ph idx="2" type="sldImg"/>
@@ -818,12 +1426,12 @@
 </p:notes>
 </file>
 
-<file path=ppt/notesSlides/notesSlide2.xml><?xml version="1.0" encoding="utf-8"?>
+<file path=ppt/notesSlides/notesSlide5.xml><?xml version="1.0" encoding="utf-8"?>
 <p:notes xmlns:a="http://schemas.openxmlformats.org/drawingml/2006/main" xmlns:r="http://schemas.openxmlformats.org/officeDocument/2006/relationships" xmlns:mc="http://schemas.openxmlformats.org/markup-compatibility/2006" xmlns:mv="urn:schemas-microsoft-com:mac:vml" xmlns:p="http://schemas.openxmlformats.org/presentationml/2006/main" xmlns:c="http://schemas.openxmlformats.org/drawingml/2006/chart" xmlns:dgm="http://schemas.openxmlformats.org/drawingml/2006/diagram" xmlns:o="urn:schemas-microsoft-com:office:office" xmlns:v="urn:schemas-microsoft-com:vml" xmlns:pvml="urn:schemas-microsoft-com:office:powerpoint" xmlns:com="http://schemas.openxmlformats.org/drawingml/2006/compatibility" xmlns:p14="http://schemas.microsoft.com/office/powerpoint/2010/main" xmlns:p15="http://schemas.microsoft.com/office/powerpoint/2012/main" showMasterPhAnim="0" showMasterSp="0">
   <p:cSld>
     <p:spTree>
       <p:nvGrpSpPr>
-        <p:cNvPr id="103" name="Shape 103"/>
+        <p:cNvPr id="123" name="Shape 123"/>
         <p:cNvGrpSpPr/>
         <p:nvPr/>
       </p:nvGrpSpPr>
@@ -837,7 +1445,7 @@
       </p:grpSpPr>
       <p:sp>
         <p:nvSpPr>
-          <p:cNvPr id="104" name="Google Shape;104;p2:notes"/>
+          <p:cNvPr id="124" name="Google Shape;124;p2:notes"/>
           <p:cNvSpPr txBox="1"/>
           <p:nvPr>
             <p:ph idx="1" type="body"/>
@@ -876,7 +1484,7 @@
       </p:sp>
       <p:sp>
         <p:nvSpPr>
-          <p:cNvPr id="105" name="Google Shape;105;p2:notes"/>
+          <p:cNvPr id="125" name="Google Shape;125;p2:notes"/>
           <p:cNvSpPr/>
           <p:nvPr>
             <p:ph idx="2" type="sldImg"/>
@@ -917,12 +1525,12 @@
 </p:notes>
 </file>
 
-<file path=ppt/notesSlides/notesSlide3.xml><?xml version="1.0" encoding="utf-8"?>
+<file path=ppt/notesSlides/notesSlide6.xml><?xml version="1.0" encoding="utf-8"?>
 <p:notes xmlns:a="http://schemas.openxmlformats.org/drawingml/2006/main" xmlns:r="http://schemas.openxmlformats.org/officeDocument/2006/relationships" xmlns:mc="http://schemas.openxmlformats.org/markup-compatibility/2006" xmlns:mv="urn:schemas-microsoft-com:mac:vml" xmlns:p="http://schemas.openxmlformats.org/presentationml/2006/main" xmlns:c="http://schemas.openxmlformats.org/drawingml/2006/chart" xmlns:dgm="http://schemas.openxmlformats.org/drawingml/2006/diagram" xmlns:o="urn:schemas-microsoft-com:office:office" xmlns:v="urn:schemas-microsoft-com:vml" xmlns:pvml="urn:schemas-microsoft-com:office:powerpoint" xmlns:com="http://schemas.openxmlformats.org/drawingml/2006/compatibility" xmlns:p14="http://schemas.microsoft.com/office/powerpoint/2010/main" xmlns:p15="http://schemas.microsoft.com/office/powerpoint/2012/main" showMasterPhAnim="0" showMasterSp="0">
   <p:cSld>
     <p:spTree>
       <p:nvGrpSpPr>
-        <p:cNvPr id="122" name="Shape 122"/>
+        <p:cNvPr id="142" name="Shape 142"/>
         <p:cNvGrpSpPr/>
         <p:nvPr/>
       </p:nvGrpSpPr>
@@ -936,7 +1544,7 @@
       </p:grpSpPr>
       <p:sp>
         <p:nvSpPr>
-          <p:cNvPr id="123" name="Google Shape;123;g8499586f39_0_47:notes"/>
+          <p:cNvPr id="143" name="Google Shape;143;g8499586f39_0_47:notes"/>
           <p:cNvSpPr txBox="1"/>
           <p:nvPr>
             <p:ph idx="1" type="body"/>
@@ -975,7 +1583,7 @@
       </p:sp>
       <p:sp>
         <p:nvSpPr>
-          <p:cNvPr id="124" name="Google Shape;124;g8499586f39_0_47:notes"/>
+          <p:cNvPr id="144" name="Google Shape;144;g8499586f39_0_47:notes"/>
           <p:cNvSpPr/>
           <p:nvPr>
             <p:ph idx="2" type="sldImg"/>
@@ -1016,12 +1624,12 @@
 </p:notes>
 </file>
 
-<file path=ppt/notesSlides/notesSlide4.xml><?xml version="1.0" encoding="utf-8"?>
+<file path=ppt/notesSlides/notesSlide7.xml><?xml version="1.0" encoding="utf-8"?>
 <p:notes xmlns:a="http://schemas.openxmlformats.org/drawingml/2006/main" xmlns:r="http://schemas.openxmlformats.org/officeDocument/2006/relationships" xmlns:mc="http://schemas.openxmlformats.org/markup-compatibility/2006" xmlns:mv="urn:schemas-microsoft-com:mac:vml" xmlns:p="http://schemas.openxmlformats.org/presentationml/2006/main" xmlns:c="http://schemas.openxmlformats.org/drawingml/2006/chart" xmlns:dgm="http://schemas.openxmlformats.org/drawingml/2006/diagram" xmlns:o="urn:schemas-microsoft-com:office:office" xmlns:v="urn:schemas-microsoft-com:vml" xmlns:pvml="urn:schemas-microsoft-com:office:powerpoint" xmlns:com="http://schemas.openxmlformats.org/drawingml/2006/compatibility" xmlns:p14="http://schemas.microsoft.com/office/powerpoint/2010/main" xmlns:p15="http://schemas.microsoft.com/office/powerpoint/2012/main" showMasterPhAnim="0" showMasterSp="0">
   <p:cSld>
     <p:spTree>
       <p:nvGrpSpPr>
-        <p:cNvPr id="138" name="Shape 138"/>
+        <p:cNvPr id="158" name="Shape 158"/>
         <p:cNvGrpSpPr/>
         <p:nvPr/>
       </p:nvGrpSpPr>
@@ -1035,7 +1643,7 @@
       </p:grpSpPr>
       <p:sp>
         <p:nvSpPr>
-          <p:cNvPr id="139" name="Google Shape;139;g8499586f39_0_66:notes"/>
+          <p:cNvPr id="159" name="Google Shape;159;g8499586f39_0_66:notes"/>
           <p:cNvSpPr txBox="1"/>
           <p:nvPr>
             <p:ph idx="1" type="body"/>
@@ -1074,7 +1682,7 @@
       </p:sp>
       <p:sp>
         <p:nvSpPr>
-          <p:cNvPr id="140" name="Google Shape;140;g8499586f39_0_66:notes"/>
+          <p:cNvPr id="160" name="Google Shape;160;g8499586f39_0_66:notes"/>
           <p:cNvSpPr/>
           <p:nvPr>
             <p:ph idx="2" type="sldImg"/>
@@ -1115,12 +1723,12 @@
 </p:notes>
 </file>
 
-<file path=ppt/notesSlides/notesSlide5.xml><?xml version="1.0" encoding="utf-8"?>
+<file path=ppt/notesSlides/notesSlide8.xml><?xml version="1.0" encoding="utf-8"?>
 <p:notes xmlns:a="http://schemas.openxmlformats.org/drawingml/2006/main" xmlns:r="http://schemas.openxmlformats.org/officeDocument/2006/relationships" xmlns:mc="http://schemas.openxmlformats.org/markup-compatibility/2006" xmlns:mv="urn:schemas-microsoft-com:mac:vml" xmlns:p="http://schemas.openxmlformats.org/presentationml/2006/main" xmlns:c="http://schemas.openxmlformats.org/drawingml/2006/chart" xmlns:dgm="http://schemas.openxmlformats.org/drawingml/2006/diagram" xmlns:o="urn:schemas-microsoft-com:office:office" xmlns:v="urn:schemas-microsoft-com:vml" xmlns:pvml="urn:schemas-microsoft-com:office:powerpoint" xmlns:com="http://schemas.openxmlformats.org/drawingml/2006/compatibility" xmlns:p14="http://schemas.microsoft.com/office/powerpoint/2010/main" xmlns:p15="http://schemas.microsoft.com/office/powerpoint/2012/main" showMasterPhAnim="0" showMasterSp="0">
   <p:cSld>
     <p:spTree>
       <p:nvGrpSpPr>
-        <p:cNvPr id="153" name="Shape 153"/>
+        <p:cNvPr id="173" name="Shape 173"/>
         <p:cNvGrpSpPr/>
         <p:nvPr/>
       </p:nvGrpSpPr>
@@ -1134,7 +1742,7 @@
       </p:grpSpPr>
       <p:sp>
         <p:nvSpPr>
-          <p:cNvPr id="154" name="Google Shape;154;g8499586f39_0_120:notes"/>
+          <p:cNvPr id="174" name="Google Shape;174;g87b2d08c9d_0_7:notes"/>
           <p:cNvSpPr/>
           <p:nvPr>
             <p:ph idx="2" type="sldImg"/>
@@ -1169,7 +1777,106 @@
       </p:sp>
       <p:sp>
         <p:nvSpPr>
-          <p:cNvPr id="155" name="Google Shape;155;g8499586f39_0_120:notes"/>
+          <p:cNvPr id="175" name="Google Shape;175;g87b2d08c9d_0_7:notes"/>
+          <p:cNvSpPr txBox="1"/>
+          <p:nvPr>
+            <p:ph idx="1" type="body"/>
+          </p:nvPr>
+        </p:nvSpPr>
+        <p:spPr>
+          <a:xfrm>
+            <a:off x="685800" y="4724175"/>
+            <a:ext cx="5486400" cy="4475700"/>
+          </a:xfrm>
+          <a:prstGeom prst="rect">
+            <a:avLst/>
+          </a:prstGeom>
+        </p:spPr>
+        <p:txBody>
+          <a:bodyPr anchorCtr="0" anchor="t" bIns="91425" lIns="91425" spcFirstLastPara="1" rIns="91425" wrap="square" tIns="91425">
+            <a:noAutofit/>
+          </a:bodyPr>
+          <a:lstStyle/>
+          <a:p>
+            <a:pPr indent="0" lvl="0" marL="0" rtl="0" algn="l">
+              <a:spcBef>
+                <a:spcPts val="0"/>
+              </a:spcBef>
+              <a:spcAft>
+                <a:spcPts val="0"/>
+              </a:spcAft>
+              <a:buNone/>
+            </a:pPr>
+            <a:r>
+              <a:t/>
+            </a:r>
+            <a:endParaRPr/>
+          </a:p>
+        </p:txBody>
+      </p:sp>
+    </p:spTree>
+  </p:cSld>
+  <p:clrMapOvr>
+    <a:masterClrMapping/>
+  </p:clrMapOvr>
+</p:notes>
+</file>
+
+<file path=ppt/notesSlides/notesSlide9.xml><?xml version="1.0" encoding="utf-8"?>
+<p:notes xmlns:a="http://schemas.openxmlformats.org/drawingml/2006/main" xmlns:r="http://schemas.openxmlformats.org/officeDocument/2006/relationships" xmlns:mc="http://schemas.openxmlformats.org/markup-compatibility/2006" xmlns:mv="urn:schemas-microsoft-com:mac:vml" xmlns:p="http://schemas.openxmlformats.org/presentationml/2006/main" xmlns:c="http://schemas.openxmlformats.org/drawingml/2006/chart" xmlns:dgm="http://schemas.openxmlformats.org/drawingml/2006/diagram" xmlns:o="urn:schemas-microsoft-com:office:office" xmlns:v="urn:schemas-microsoft-com:vml" xmlns:pvml="urn:schemas-microsoft-com:office:powerpoint" xmlns:com="http://schemas.openxmlformats.org/drawingml/2006/compatibility" xmlns:p14="http://schemas.microsoft.com/office/powerpoint/2010/main" xmlns:p15="http://schemas.microsoft.com/office/powerpoint/2012/main" showMasterPhAnim="0" showMasterSp="0">
+  <p:cSld>
+    <p:spTree>
+      <p:nvGrpSpPr>
+        <p:cNvPr id="179" name="Shape 179"/>
+        <p:cNvGrpSpPr/>
+        <p:nvPr/>
+      </p:nvGrpSpPr>
+      <p:grpSpPr>
+        <a:xfrm>
+          <a:off x="0" y="0"/>
+          <a:ext cx="0" cy="0"/>
+          <a:chOff x="0" y="0"/>
+          <a:chExt cx="0" cy="0"/>
+        </a:xfrm>
+      </p:grpSpPr>
+      <p:sp>
+        <p:nvSpPr>
+          <p:cNvPr id="180" name="Google Shape;180;g87b2d08c9d_0_25:notes"/>
+          <p:cNvSpPr/>
+          <p:nvPr>
+            <p:ph idx="2" type="sldImg"/>
+          </p:nvPr>
+        </p:nvSpPr>
+        <p:spPr>
+          <a:xfrm>
+            <a:off x="1143225" y="745925"/>
+            <a:ext cx="4572300" cy="3729600"/>
+          </a:xfrm>
+          <a:custGeom>
+            <a:rect b="b" l="l" r="r" t="t"/>
+            <a:pathLst>
+              <a:path extrusionOk="0" h="120000" w="120000">
+                <a:moveTo>
+                  <a:pt x="0" y="0"/>
+                </a:moveTo>
+                <a:lnTo>
+                  <a:pt x="120000" y="0"/>
+                </a:lnTo>
+                <a:lnTo>
+                  <a:pt x="120000" y="120000"/>
+                </a:lnTo>
+                <a:lnTo>
+                  <a:pt x="0" y="120000"/>
+                </a:lnTo>
+                <a:close/>
+              </a:path>
+            </a:pathLst>
+          </a:custGeom>
+        </p:spPr>
+      </p:sp>
+      <p:sp>
+        <p:nvSpPr>
+          <p:cNvPr id="181" name="Google Shape;181;g87b2d08c9d_0_25:notes"/>
           <p:cNvSpPr txBox="1"/>
           <p:nvPr>
             <p:ph idx="1" type="body"/>
@@ -11477,6 +12184,2174 @@
           <p:cNvPicPr preferRelativeResize="0"/>
           <p:nvPr/>
         </p:nvPicPr>
+        <p:blipFill>
+          <a:blip r:embed="rId3">
+            <a:alphaModFix/>
+          </a:blip>
+          <a:stretch>
+            <a:fillRect/>
+          </a:stretch>
+        </p:blipFill>
+        <p:spPr>
+          <a:xfrm>
+            <a:off x="944988" y="8124098"/>
+            <a:ext cx="5669725" cy="2154982"/>
+          </a:xfrm>
+          <a:prstGeom prst="rect">
+            <a:avLst/>
+          </a:prstGeom>
+          <a:noFill/>
+          <a:ln>
+            <a:noFill/>
+          </a:ln>
+        </p:spPr>
+      </p:pic>
+      <p:pic>
+        <p:nvPicPr>
+          <p:cNvPr id="85" name="Google Shape;85;p13"/>
+          <p:cNvPicPr preferRelativeResize="0"/>
+          <p:nvPr/>
+        </p:nvPicPr>
+        <p:blipFill>
+          <a:blip r:embed="rId4">
+            <a:alphaModFix/>
+          </a:blip>
+          <a:stretch>
+            <a:fillRect/>
+          </a:stretch>
+        </p:blipFill>
+        <p:spPr>
+          <a:xfrm>
+            <a:off x="2174622" y="0"/>
+            <a:ext cx="3210425" cy="5243501"/>
+          </a:xfrm>
+          <a:prstGeom prst="rect">
+            <a:avLst/>
+          </a:prstGeom>
+          <a:noFill/>
+          <a:ln>
+            <a:noFill/>
+          </a:ln>
+        </p:spPr>
+      </p:pic>
+      <p:pic>
+        <p:nvPicPr>
+          <p:cNvPr id="86" name="Google Shape;86;p13"/>
+          <p:cNvPicPr preferRelativeResize="0"/>
+          <p:nvPr/>
+        </p:nvPicPr>
+        <p:blipFill>
+          <a:blip r:embed="rId5">
+            <a:alphaModFix amt="74000"/>
+          </a:blip>
+          <a:stretch>
+            <a:fillRect/>
+          </a:stretch>
+        </p:blipFill>
+        <p:spPr>
+          <a:xfrm>
+            <a:off x="3036350" y="185501"/>
+            <a:ext cx="1486975" cy="461599"/>
+          </a:xfrm>
+          <a:prstGeom prst="rect">
+            <a:avLst/>
+          </a:prstGeom>
+          <a:noFill/>
+          <a:ln>
+            <a:noFill/>
+          </a:ln>
+        </p:spPr>
+      </p:pic>
+      <p:sp>
+        <p:nvSpPr>
+          <p:cNvPr id="87" name="Google Shape;87;p13"/>
+          <p:cNvSpPr txBox="1"/>
+          <p:nvPr>
+            <p:ph idx="1" type="subTitle"/>
+          </p:nvPr>
+        </p:nvSpPr>
+        <p:spPr>
+          <a:xfrm>
+            <a:off x="944997" y="5243503"/>
+            <a:ext cx="5669700" cy="2581500"/>
+          </a:xfrm>
+          <a:prstGeom prst="rect">
+            <a:avLst/>
+          </a:prstGeom>
+        </p:spPr>
+        <p:txBody>
+          <a:bodyPr anchorCtr="0" anchor="t" bIns="45700" lIns="91425" spcFirstLastPara="1" rIns="91425" wrap="square" tIns="45700">
+            <a:noAutofit/>
+          </a:bodyPr>
+          <a:lstStyle/>
+          <a:p>
+            <a:pPr indent="0" lvl="0" marL="0" rtl="0" algn="ctr">
+              <a:lnSpc>
+                <a:spcPct val="100000"/>
+              </a:lnSpc>
+              <a:spcBef>
+                <a:spcPts val="0"/>
+              </a:spcBef>
+              <a:spcAft>
+                <a:spcPts val="0"/>
+              </a:spcAft>
+              <a:buClr>
+                <a:schemeClr val="dk1"/>
+              </a:buClr>
+              <a:buFont typeface="Arial"/>
+              <a:buNone/>
+            </a:pPr>
+            <a:r>
+              <a:rPr b="1" lang="nl-NL" sz="4800">
+                <a:solidFill>
+                  <a:srgbClr val="575656"/>
+                </a:solidFill>
+              </a:rPr>
+              <a:t>Makerslogboek</a:t>
+            </a:r>
+            <a:endParaRPr sz="4800">
+              <a:latin typeface="Arial"/>
+              <a:ea typeface="Arial"/>
+              <a:cs typeface="Arial"/>
+              <a:sym typeface="Arial"/>
+            </a:endParaRPr>
+          </a:p>
+          <a:p>
+            <a:pPr indent="0" lvl="0" marL="0" rtl="0" algn="ctr">
+              <a:spcBef>
+                <a:spcPts val="827"/>
+              </a:spcBef>
+              <a:spcAft>
+                <a:spcPts val="0"/>
+              </a:spcAft>
+              <a:buNone/>
+            </a:pPr>
+            <a:r>
+              <a:t/>
+            </a:r>
+            <a:endParaRPr/>
+          </a:p>
+        </p:txBody>
+      </p:sp>
+      <p:pic>
+        <p:nvPicPr>
+          <p:cNvPr id="88" name="Google Shape;88;p13"/>
+          <p:cNvPicPr preferRelativeResize="0"/>
+          <p:nvPr/>
+        </p:nvPicPr>
+        <p:blipFill>
+          <a:blip r:embed="rId6">
+            <a:alphaModFix/>
+          </a:blip>
+          <a:stretch>
+            <a:fillRect/>
+          </a:stretch>
+        </p:blipFill>
+        <p:spPr>
+          <a:xfrm>
+            <a:off x="2418234" y="5749361"/>
+            <a:ext cx="2723206" cy="2581501"/>
+          </a:xfrm>
+          <a:prstGeom prst="rect">
+            <a:avLst/>
+          </a:prstGeom>
+          <a:noFill/>
+          <a:ln>
+            <a:noFill/>
+          </a:ln>
+        </p:spPr>
+      </p:pic>
+    </p:spTree>
+  </p:cSld>
+  <p:clrMapOvr>
+    <a:masterClrMapping/>
+  </p:clrMapOvr>
+</p:sld>
+</file>
+
+<file path=ppt/slides/slide10.xml><?xml version="1.0" encoding="utf-8"?>
+<p:sld xmlns:a="http://schemas.openxmlformats.org/drawingml/2006/main" xmlns:r="http://schemas.openxmlformats.org/officeDocument/2006/relationships" xmlns:mc="http://schemas.openxmlformats.org/markup-compatibility/2006" xmlns:mv="urn:schemas-microsoft-com:mac:vml" xmlns:p="http://schemas.openxmlformats.org/presentationml/2006/main" xmlns:c="http://schemas.openxmlformats.org/drawingml/2006/chart" xmlns:dgm="http://schemas.openxmlformats.org/drawingml/2006/diagram" xmlns:o="urn:schemas-microsoft-com:office:office" xmlns:v="urn:schemas-microsoft-com:vml" xmlns:pvml="urn:schemas-microsoft-com:office:powerpoint" xmlns:com="http://schemas.openxmlformats.org/drawingml/2006/compatibility" xmlns:p14="http://schemas.microsoft.com/office/powerpoint/2010/main" xmlns:p15="http://schemas.microsoft.com/office/powerpoint/2012/main">
+  <p:cSld>
+    <p:spTree>
+      <p:nvGrpSpPr>
+        <p:cNvPr id="188" name="Shape 188"/>
+        <p:cNvGrpSpPr/>
+        <p:nvPr/>
+      </p:nvGrpSpPr>
+      <p:grpSpPr>
+        <a:xfrm>
+          <a:off x="0" y="0"/>
+          <a:ext cx="0" cy="0"/>
+          <a:chOff x="0" y="0"/>
+          <a:chExt cx="0" cy="0"/>
+        </a:xfrm>
+      </p:grpSpPr>
+      <p:graphicFrame>
+        <p:nvGraphicFramePr>
+          <p:cNvPr id="189" name="Google Shape;189;p22"/>
+          <p:cNvGraphicFramePr/>
+          <p:nvPr/>
+        </p:nvGraphicFramePr>
+        <p:xfrm>
+          <a:off x="804550" y="876313"/>
+          <a:ext cx="3000000" cy="3000000"/>
+        </p:xfrm>
+        <a:graphic>
+          <a:graphicData uri="http://schemas.openxmlformats.org/drawingml/2006/table">
+            <a:tbl>
+              <a:tblPr>
+                <a:noFill/>
+                <a:tableStyleId>{36927DBD-E25B-4E85-9199-363A602F9E54}</a:tableStyleId>
+              </a:tblPr>
+              <a:tblGrid>
+                <a:gridCol w="1983525"/>
+                <a:gridCol w="1983525"/>
+                <a:gridCol w="1983525"/>
+              </a:tblGrid>
+              <a:tr h="1111850">
+                <a:tc>
+                  <a:txBody>
+                    <a:bodyPr/>
+                    <a:lstStyle/>
+                    <a:p>
+                      <a:pPr indent="0" lvl="0" marL="0" rtl="0" algn="ctr">
+                        <a:spcBef>
+                          <a:spcPts val="0"/>
+                        </a:spcBef>
+                        <a:spcAft>
+                          <a:spcPts val="0"/>
+                        </a:spcAft>
+                        <a:buNone/>
+                      </a:pPr>
+                      <a:r>
+                        <a:rPr lang="nl-NL" sz="1800"/>
+                        <a:t>Ik volgde </a:t>
+                      </a:r>
+                      <a:endParaRPr sz="1800"/>
+                    </a:p>
+                    <a:p>
+                      <a:pPr indent="0" lvl="0" marL="0" rtl="0" algn="ctr">
+                        <a:spcBef>
+                          <a:spcPts val="0"/>
+                        </a:spcBef>
+                        <a:spcAft>
+                          <a:spcPts val="0"/>
+                        </a:spcAft>
+                        <a:buNone/>
+                      </a:pPr>
+                      <a:r>
+                        <a:rPr lang="nl-NL" sz="1800"/>
+                        <a:t>ALLE </a:t>
+                      </a:r>
+                      <a:endParaRPr sz="1800"/>
+                    </a:p>
+                    <a:p>
+                      <a:pPr indent="0" lvl="0" marL="0" rtl="0" algn="ctr">
+                        <a:spcBef>
+                          <a:spcPts val="0"/>
+                        </a:spcBef>
+                        <a:spcAft>
+                          <a:spcPts val="0"/>
+                        </a:spcAft>
+                        <a:buNone/>
+                      </a:pPr>
+                      <a:r>
+                        <a:rPr lang="nl-NL" sz="1800"/>
+                        <a:t>instructies.</a:t>
+                      </a:r>
+                      <a:endParaRPr sz="1800"/>
+                    </a:p>
+                  </a:txBody>
+                  <a:tcPr marT="91425" marB="91425" marR="91425" marL="91425"/>
+                </a:tc>
+                <a:tc>
+                  <a:txBody>
+                    <a:bodyPr/>
+                    <a:lstStyle/>
+                    <a:p>
+                      <a:pPr indent="0" lvl="0" marL="0" rtl="0" algn="ctr">
+                        <a:spcBef>
+                          <a:spcPts val="0"/>
+                        </a:spcBef>
+                        <a:spcAft>
+                          <a:spcPts val="0"/>
+                        </a:spcAft>
+                        <a:buNone/>
+                      </a:pPr>
+                      <a:r>
+                        <a:rPr lang="nl-NL" sz="1800"/>
+                        <a:t>Ik vo</a:t>
+                      </a:r>
+                      <a:r>
+                        <a:rPr lang="nl-NL" sz="1800"/>
+                        <a:t>lgde SOMMIGE</a:t>
+                      </a:r>
+                      <a:endParaRPr sz="1800"/>
+                    </a:p>
+                    <a:p>
+                      <a:pPr indent="0" lvl="0" marL="0" rtl="0" algn="ctr">
+                        <a:spcBef>
+                          <a:spcPts val="0"/>
+                        </a:spcBef>
+                        <a:spcAft>
+                          <a:spcPts val="0"/>
+                        </a:spcAft>
+                        <a:buNone/>
+                      </a:pPr>
+                      <a:r>
+                        <a:rPr lang="nl-NL" sz="1800"/>
+                        <a:t>instructies.</a:t>
+                      </a:r>
+                      <a:endParaRPr sz="1800"/>
+                    </a:p>
+                  </a:txBody>
+                  <a:tcPr marT="91425" marB="91425" marR="91425" marL="91425"/>
+                </a:tc>
+                <a:tc>
+                  <a:txBody>
+                    <a:bodyPr/>
+                    <a:lstStyle/>
+                    <a:p>
+                      <a:pPr indent="0" lvl="0" marL="0" rtl="0" algn="ctr">
+                        <a:spcBef>
+                          <a:spcPts val="0"/>
+                        </a:spcBef>
+                        <a:spcAft>
+                          <a:spcPts val="0"/>
+                        </a:spcAft>
+                        <a:buNone/>
+                      </a:pPr>
+                      <a:r>
+                        <a:rPr lang="nl-NL" sz="1800"/>
+                        <a:t>Ik volgde GEEN </a:t>
+                      </a:r>
+                      <a:endParaRPr sz="1800"/>
+                    </a:p>
+                    <a:p>
+                      <a:pPr indent="0" lvl="0" marL="0" rtl="0" algn="ctr">
+                        <a:spcBef>
+                          <a:spcPts val="0"/>
+                        </a:spcBef>
+                        <a:spcAft>
+                          <a:spcPts val="0"/>
+                        </a:spcAft>
+                        <a:buNone/>
+                      </a:pPr>
+                      <a:r>
+                        <a:rPr lang="nl-NL" sz="1800"/>
+                        <a:t>instructies.</a:t>
+                      </a:r>
+                      <a:endParaRPr sz="1800"/>
+                    </a:p>
+                  </a:txBody>
+                  <a:tcPr marT="91425" marB="91425" marR="91425" marL="91425"/>
+                </a:tc>
+              </a:tr>
+              <a:tr h="1445375">
+                <a:tc>
+                  <a:txBody>
+                    <a:bodyPr/>
+                    <a:lstStyle/>
+                    <a:p>
+                      <a:pPr indent="0" lvl="0" marL="0" rtl="0" algn="ctr">
+                        <a:spcBef>
+                          <a:spcPts val="0"/>
+                        </a:spcBef>
+                        <a:spcAft>
+                          <a:spcPts val="0"/>
+                        </a:spcAft>
+                        <a:buNone/>
+                      </a:pPr>
+                      <a:r>
+                        <a:rPr lang="nl-NL" sz="1800"/>
+                        <a:t>Ik heb mijn BEST gedaan qua inspanning en</a:t>
+                      </a:r>
+                      <a:endParaRPr sz="1800"/>
+                    </a:p>
+                    <a:p>
+                      <a:pPr indent="0" lvl="0" marL="0" rtl="0" algn="ctr">
+                        <a:spcBef>
+                          <a:spcPts val="0"/>
+                        </a:spcBef>
+                        <a:spcAft>
+                          <a:spcPts val="0"/>
+                        </a:spcAft>
+                        <a:buNone/>
+                      </a:pPr>
+                      <a:r>
+                        <a:rPr lang="nl-NL" sz="1800"/>
+                        <a:t>volharding.</a:t>
+                      </a:r>
+                      <a:endParaRPr sz="1800"/>
+                    </a:p>
+                    <a:p>
+                      <a:pPr indent="0" lvl="0" marL="0" rtl="0" algn="ctr">
+                        <a:spcBef>
+                          <a:spcPts val="0"/>
+                        </a:spcBef>
+                        <a:spcAft>
+                          <a:spcPts val="0"/>
+                        </a:spcAft>
+                        <a:buNone/>
+                      </a:pPr>
+                      <a:r>
+                        <a:t/>
+                      </a:r>
+                      <a:endParaRPr sz="1800"/>
+                    </a:p>
+                  </a:txBody>
+                  <a:tcPr marT="91425" marB="91425" marR="91425" marL="91425"/>
+                </a:tc>
+                <a:tc>
+                  <a:txBody>
+                    <a:bodyPr/>
+                    <a:lstStyle/>
+                    <a:p>
+                      <a:pPr indent="0" lvl="0" marL="0" rtl="0" algn="ctr">
+                        <a:spcBef>
+                          <a:spcPts val="0"/>
+                        </a:spcBef>
+                        <a:spcAft>
+                          <a:spcPts val="0"/>
+                        </a:spcAft>
+                        <a:buNone/>
+                      </a:pPr>
+                      <a:r>
+                        <a:rPr lang="nl-NL" sz="1800"/>
+                        <a:t>Ik heb GOED gedaan qua </a:t>
+                      </a:r>
+                      <a:endParaRPr sz="1800"/>
+                    </a:p>
+                    <a:p>
+                      <a:pPr indent="0" lvl="0" marL="0" rtl="0" algn="ctr">
+                        <a:spcBef>
+                          <a:spcPts val="0"/>
+                        </a:spcBef>
+                        <a:spcAft>
+                          <a:spcPts val="0"/>
+                        </a:spcAft>
+                        <a:buNone/>
+                      </a:pPr>
+                      <a:r>
+                        <a:rPr lang="nl-NL" sz="1800"/>
+                        <a:t>inspanning en</a:t>
+                      </a:r>
+                      <a:endParaRPr sz="1800"/>
+                    </a:p>
+                    <a:p>
+                      <a:pPr indent="0" lvl="0" marL="0" rtl="0" algn="ctr">
+                        <a:spcBef>
+                          <a:spcPts val="0"/>
+                        </a:spcBef>
+                        <a:spcAft>
+                          <a:spcPts val="0"/>
+                        </a:spcAft>
+                        <a:buNone/>
+                      </a:pPr>
+                      <a:r>
+                        <a:rPr lang="nl-NL" sz="1800"/>
+                        <a:t>volharding.</a:t>
+                      </a:r>
+                      <a:endParaRPr sz="1800"/>
+                    </a:p>
+                  </a:txBody>
+                  <a:tcPr marT="91425" marB="91425" marR="91425" marL="91425"/>
+                </a:tc>
+                <a:tc>
+                  <a:txBody>
+                    <a:bodyPr/>
+                    <a:lstStyle/>
+                    <a:p>
+                      <a:pPr indent="0" lvl="0" marL="0" rtl="0" algn="ctr">
+                        <a:spcBef>
+                          <a:spcPts val="0"/>
+                        </a:spcBef>
+                        <a:spcAft>
+                          <a:spcPts val="0"/>
+                        </a:spcAft>
+                        <a:buNone/>
+                      </a:pPr>
+                      <a:r>
+                        <a:rPr lang="nl-NL" sz="1800"/>
+                        <a:t>Ik heb GEEN inspanning noch </a:t>
+                      </a:r>
+                      <a:endParaRPr sz="1800"/>
+                    </a:p>
+                    <a:p>
+                      <a:pPr indent="0" lvl="0" marL="0" rtl="0" algn="ctr">
+                        <a:spcBef>
+                          <a:spcPts val="0"/>
+                        </a:spcBef>
+                        <a:spcAft>
+                          <a:spcPts val="0"/>
+                        </a:spcAft>
+                        <a:buNone/>
+                      </a:pPr>
+                      <a:r>
+                        <a:rPr lang="nl-NL" sz="1800"/>
+                        <a:t>volharding laten zien.</a:t>
+                      </a:r>
+                      <a:endParaRPr sz="1800"/>
+                    </a:p>
+                  </a:txBody>
+                  <a:tcPr marT="91425" marB="91425" marR="91425" marL="91425"/>
+                </a:tc>
+              </a:tr>
+              <a:tr h="1955950">
+                <a:tc>
+                  <a:txBody>
+                    <a:bodyPr/>
+                    <a:lstStyle/>
+                    <a:p>
+                      <a:pPr indent="0" lvl="0" marL="0" rtl="0" algn="ctr">
+                        <a:spcBef>
+                          <a:spcPts val="0"/>
+                        </a:spcBef>
+                        <a:spcAft>
+                          <a:spcPts val="0"/>
+                        </a:spcAft>
+                        <a:buNone/>
+                      </a:pPr>
+                      <a:r>
+                        <a:rPr lang="nl-NL" sz="1800"/>
+                        <a:t>Ik heb ALLE  stappen van het process doorlopen en heb mijn logboek  met VELE details ingevuld.</a:t>
+                      </a:r>
+                      <a:endParaRPr sz="1800"/>
+                    </a:p>
+                    <a:p>
+                      <a:pPr indent="0" lvl="0" marL="0" rtl="0" algn="ctr">
+                        <a:spcBef>
+                          <a:spcPts val="0"/>
+                        </a:spcBef>
+                        <a:spcAft>
+                          <a:spcPts val="0"/>
+                        </a:spcAft>
+                        <a:buNone/>
+                      </a:pPr>
+                      <a:r>
+                        <a:t/>
+                      </a:r>
+                      <a:endParaRPr sz="1800"/>
+                    </a:p>
+                  </a:txBody>
+                  <a:tcPr marT="91425" marB="91425" marR="91425" marL="91425"/>
+                </a:tc>
+                <a:tc>
+                  <a:txBody>
+                    <a:bodyPr/>
+                    <a:lstStyle/>
+                    <a:p>
+                      <a:pPr indent="0" lvl="0" marL="0" rtl="0" algn="ctr">
+                        <a:spcBef>
+                          <a:spcPts val="0"/>
+                        </a:spcBef>
+                        <a:spcAft>
+                          <a:spcPts val="0"/>
+                        </a:spcAft>
+                        <a:buNone/>
+                      </a:pPr>
+                      <a:r>
+                        <a:rPr lang="nl-NL" sz="1800"/>
+                        <a:t>Ik heb ENKELE stappen van het process doorlopen en heb mijn logboek  met ENKELE</a:t>
+                      </a:r>
+                      <a:endParaRPr sz="1800"/>
+                    </a:p>
+                    <a:p>
+                      <a:pPr indent="0" lvl="0" marL="0" rtl="0" algn="ctr">
+                        <a:spcBef>
+                          <a:spcPts val="0"/>
+                        </a:spcBef>
+                        <a:spcAft>
+                          <a:spcPts val="0"/>
+                        </a:spcAft>
+                        <a:buNone/>
+                      </a:pPr>
+                      <a:r>
+                        <a:rPr lang="nl-NL" sz="1800"/>
+                        <a:t>details ingevuld.</a:t>
+                      </a:r>
+                      <a:endParaRPr sz="1800"/>
+                    </a:p>
+                  </a:txBody>
+                  <a:tcPr marT="91425" marB="91425" marR="91425" marL="91425"/>
+                </a:tc>
+                <a:tc>
+                  <a:txBody>
+                    <a:bodyPr/>
+                    <a:lstStyle/>
+                    <a:p>
+                      <a:pPr indent="0" lvl="0" marL="0" rtl="0" algn="ctr">
+                        <a:spcBef>
+                          <a:spcPts val="0"/>
+                        </a:spcBef>
+                        <a:spcAft>
+                          <a:spcPts val="0"/>
+                        </a:spcAft>
+                        <a:buNone/>
+                      </a:pPr>
+                      <a:r>
+                        <a:rPr lang="nl-NL" sz="1800"/>
+                        <a:t>IK HEB GEEN gebruik </a:t>
+                      </a:r>
+                      <a:endParaRPr sz="1800"/>
+                    </a:p>
+                    <a:p>
+                      <a:pPr indent="0" lvl="0" marL="0" rtl="0" algn="ctr">
+                        <a:spcBef>
+                          <a:spcPts val="0"/>
+                        </a:spcBef>
+                        <a:spcAft>
+                          <a:spcPts val="0"/>
+                        </a:spcAft>
+                        <a:buNone/>
+                      </a:pPr>
+                      <a:r>
+                        <a:rPr lang="nl-NL" sz="1800"/>
+                        <a:t>gemaakt van mijn logboek.</a:t>
+                      </a:r>
+                      <a:endParaRPr sz="1800"/>
+                    </a:p>
+                  </a:txBody>
+                  <a:tcPr marT="91425" marB="91425" marR="91425" marL="91425"/>
+                </a:tc>
+              </a:tr>
+              <a:tr h="1445375">
+                <a:tc>
+                  <a:txBody>
+                    <a:bodyPr/>
+                    <a:lstStyle/>
+                    <a:p>
+                      <a:pPr indent="0" lvl="0" marL="0" rtl="0" algn="ctr">
+                        <a:spcBef>
+                          <a:spcPts val="0"/>
+                        </a:spcBef>
+                        <a:spcAft>
+                          <a:spcPts val="0"/>
+                        </a:spcAft>
+                        <a:buNone/>
+                      </a:pPr>
+                      <a:r>
+                        <a:rPr lang="nl-NL" sz="1800"/>
+                        <a:t>Ik was HEEL NAUWKEURIG </a:t>
+                      </a:r>
+                      <a:endParaRPr sz="1800"/>
+                    </a:p>
+                    <a:p>
+                      <a:pPr indent="0" lvl="0" marL="0" rtl="0" algn="ctr">
+                        <a:spcBef>
+                          <a:spcPts val="0"/>
+                        </a:spcBef>
+                        <a:spcAft>
+                          <a:spcPts val="0"/>
+                        </a:spcAft>
+                        <a:buNone/>
+                      </a:pPr>
+                      <a:r>
+                        <a:rPr lang="nl-NL" sz="1800"/>
+                        <a:t>met testen,</a:t>
+                      </a:r>
+                      <a:endParaRPr sz="1800"/>
+                    </a:p>
+                    <a:p>
+                      <a:pPr indent="0" lvl="0" marL="0" rtl="0" algn="ctr">
+                        <a:spcBef>
+                          <a:spcPts val="0"/>
+                        </a:spcBef>
+                        <a:spcAft>
+                          <a:spcPts val="0"/>
+                        </a:spcAft>
+                        <a:buNone/>
+                      </a:pPr>
+                      <a:r>
+                        <a:rPr lang="nl-NL" sz="1800"/>
+                        <a:t>berekenen, en meten.</a:t>
+                      </a:r>
+                      <a:endParaRPr sz="1800"/>
+                    </a:p>
+                  </a:txBody>
+                  <a:tcPr marT="91425" marB="91425" marR="91425" marL="91425"/>
+                </a:tc>
+                <a:tc>
+                  <a:txBody>
+                    <a:bodyPr/>
+                    <a:lstStyle/>
+                    <a:p>
+                      <a:pPr indent="0" lvl="0" marL="0" rtl="0" algn="ctr">
+                        <a:spcBef>
+                          <a:spcPts val="0"/>
+                        </a:spcBef>
+                        <a:spcAft>
+                          <a:spcPts val="0"/>
+                        </a:spcAft>
+                        <a:buNone/>
+                      </a:pPr>
+                      <a:r>
+                        <a:rPr lang="nl-NL" sz="1800"/>
+                        <a:t>Ik was SOMS</a:t>
+                      </a:r>
+                      <a:endParaRPr sz="1800"/>
+                    </a:p>
+                    <a:p>
+                      <a:pPr indent="0" lvl="0" marL="0" rtl="0" algn="ctr">
+                        <a:spcBef>
+                          <a:spcPts val="0"/>
+                        </a:spcBef>
+                        <a:spcAft>
+                          <a:spcPts val="0"/>
+                        </a:spcAft>
+                        <a:buNone/>
+                      </a:pPr>
+                      <a:r>
+                        <a:rPr lang="nl-NL" sz="1800"/>
+                        <a:t>NAUWKEURIG  </a:t>
+                      </a:r>
+                      <a:endParaRPr sz="1800"/>
+                    </a:p>
+                    <a:p>
+                      <a:pPr indent="0" lvl="0" marL="0" rtl="0" algn="ctr">
+                        <a:spcBef>
+                          <a:spcPts val="0"/>
+                        </a:spcBef>
+                        <a:spcAft>
+                          <a:spcPts val="0"/>
+                        </a:spcAft>
+                        <a:buNone/>
+                      </a:pPr>
+                      <a:r>
+                        <a:rPr lang="nl-NL" sz="1800"/>
+                        <a:t>met testen,</a:t>
+                      </a:r>
+                      <a:endParaRPr sz="1800"/>
+                    </a:p>
+                    <a:p>
+                      <a:pPr indent="0" lvl="0" marL="0" rtl="0" algn="ctr">
+                        <a:spcBef>
+                          <a:spcPts val="0"/>
+                        </a:spcBef>
+                        <a:spcAft>
+                          <a:spcPts val="0"/>
+                        </a:spcAft>
+                        <a:buNone/>
+                      </a:pPr>
+                      <a:r>
+                        <a:rPr lang="nl-NL" sz="1800"/>
+                        <a:t>berekenen, en</a:t>
+                      </a:r>
+                      <a:endParaRPr sz="1800"/>
+                    </a:p>
+                    <a:p>
+                      <a:pPr indent="0" lvl="0" marL="0" rtl="0" algn="ctr">
+                        <a:spcBef>
+                          <a:spcPts val="0"/>
+                        </a:spcBef>
+                        <a:spcAft>
+                          <a:spcPts val="0"/>
+                        </a:spcAft>
+                        <a:buNone/>
+                      </a:pPr>
+                      <a:r>
+                        <a:rPr lang="nl-NL" sz="1800"/>
+                        <a:t>meten.</a:t>
+                      </a:r>
+                      <a:endParaRPr sz="1800"/>
+                    </a:p>
+                  </a:txBody>
+                  <a:tcPr marT="91425" marB="91425" marR="91425" marL="91425"/>
+                </a:tc>
+                <a:tc>
+                  <a:txBody>
+                    <a:bodyPr/>
+                    <a:lstStyle/>
+                    <a:p>
+                      <a:pPr indent="0" lvl="0" marL="0" rtl="0" algn="ctr">
+                        <a:spcBef>
+                          <a:spcPts val="0"/>
+                        </a:spcBef>
+                        <a:spcAft>
+                          <a:spcPts val="0"/>
+                        </a:spcAft>
+                        <a:buNone/>
+                      </a:pPr>
+                      <a:r>
+                        <a:rPr lang="nl-NL" sz="1800"/>
+                        <a:t>Ik was NIET</a:t>
+                      </a:r>
+                      <a:endParaRPr sz="1800"/>
+                    </a:p>
+                    <a:p>
+                      <a:pPr indent="0" lvl="0" marL="0" rtl="0" algn="ctr">
+                        <a:spcBef>
+                          <a:spcPts val="0"/>
+                        </a:spcBef>
+                        <a:spcAft>
+                          <a:spcPts val="0"/>
+                        </a:spcAft>
+                        <a:buNone/>
+                      </a:pPr>
+                      <a:r>
+                        <a:rPr lang="nl-NL" sz="1800"/>
+                        <a:t>NAUWKEURIG </a:t>
+                      </a:r>
+                      <a:endParaRPr sz="1800"/>
+                    </a:p>
+                    <a:p>
+                      <a:pPr indent="0" lvl="0" marL="0" rtl="0" algn="ctr">
+                        <a:spcBef>
+                          <a:spcPts val="0"/>
+                        </a:spcBef>
+                        <a:spcAft>
+                          <a:spcPts val="0"/>
+                        </a:spcAft>
+                        <a:buNone/>
+                      </a:pPr>
+                      <a:r>
+                        <a:rPr lang="nl-NL" sz="1800"/>
+                        <a:t> met testen,</a:t>
+                      </a:r>
+                      <a:endParaRPr sz="1800"/>
+                    </a:p>
+                    <a:p>
+                      <a:pPr indent="0" lvl="0" marL="0" rtl="0" algn="ctr">
+                        <a:spcBef>
+                          <a:spcPts val="0"/>
+                        </a:spcBef>
+                        <a:spcAft>
+                          <a:spcPts val="0"/>
+                        </a:spcAft>
+                        <a:buNone/>
+                      </a:pPr>
+                      <a:r>
+                        <a:rPr lang="nl-NL" sz="1800"/>
+                        <a:t>berekenen, en</a:t>
+                      </a:r>
+                      <a:endParaRPr sz="1800"/>
+                    </a:p>
+                    <a:p>
+                      <a:pPr indent="0" lvl="0" marL="0" rtl="0" algn="ctr">
+                        <a:spcBef>
+                          <a:spcPts val="0"/>
+                        </a:spcBef>
+                        <a:spcAft>
+                          <a:spcPts val="0"/>
+                        </a:spcAft>
+                        <a:buNone/>
+                      </a:pPr>
+                      <a:r>
+                        <a:rPr lang="nl-NL" sz="1800"/>
+                        <a:t>meten.</a:t>
+                      </a:r>
+                      <a:endParaRPr sz="1800"/>
+                    </a:p>
+                  </a:txBody>
+                  <a:tcPr marT="91425" marB="91425" marR="91425" marL="91425"/>
+                </a:tc>
+              </a:tr>
+              <a:tr h="1445375">
+                <a:tc>
+                  <a:txBody>
+                    <a:bodyPr/>
+                    <a:lstStyle/>
+                    <a:p>
+                      <a:pPr indent="0" lvl="0" marL="0" rtl="0" algn="ctr">
+                        <a:spcBef>
+                          <a:spcPts val="0"/>
+                        </a:spcBef>
+                        <a:spcAft>
+                          <a:spcPts val="0"/>
+                        </a:spcAft>
+                        <a:buNone/>
+                      </a:pPr>
+                      <a:r>
+                        <a:rPr lang="nl-NL" sz="1800"/>
+                        <a:t>Ik heb GOED met mijn partner of groepsleden samengewerkt.</a:t>
+                      </a:r>
+                      <a:endParaRPr sz="1800"/>
+                    </a:p>
+                    <a:p>
+                      <a:pPr indent="0" lvl="0" marL="0" rtl="0" algn="ctr">
+                        <a:spcBef>
+                          <a:spcPts val="0"/>
+                        </a:spcBef>
+                        <a:spcAft>
+                          <a:spcPts val="0"/>
+                        </a:spcAft>
+                        <a:buNone/>
+                      </a:pPr>
+                      <a:r>
+                        <a:t/>
+                      </a:r>
+                      <a:endParaRPr sz="1800"/>
+                    </a:p>
+                  </a:txBody>
+                  <a:tcPr marT="91425" marB="91425" marR="91425" marL="91425"/>
+                </a:tc>
+                <a:tc>
+                  <a:txBody>
+                    <a:bodyPr/>
+                    <a:lstStyle/>
+                    <a:p>
+                      <a:pPr indent="0" lvl="0" marL="0" rtl="0" algn="ctr">
+                        <a:spcBef>
+                          <a:spcPts val="0"/>
+                        </a:spcBef>
+                        <a:spcAft>
+                          <a:spcPts val="0"/>
+                        </a:spcAft>
+                        <a:buNone/>
+                      </a:pPr>
+                      <a:r>
+                        <a:rPr lang="nl-NL" sz="1800"/>
+                        <a:t>Ik heb NIET ZO GOED met mijn partner of</a:t>
+                      </a:r>
+                      <a:endParaRPr sz="1800"/>
+                    </a:p>
+                    <a:p>
+                      <a:pPr indent="0" lvl="0" marL="0" rtl="0" algn="ctr">
+                        <a:spcBef>
+                          <a:spcPts val="0"/>
+                        </a:spcBef>
+                        <a:spcAft>
+                          <a:spcPts val="0"/>
+                        </a:spcAft>
+                        <a:buNone/>
+                      </a:pPr>
+                      <a:r>
+                        <a:rPr lang="nl-NL" sz="1800"/>
+                        <a:t>groepsleden samengewerkt.</a:t>
+                      </a:r>
+                      <a:endParaRPr sz="1800"/>
+                    </a:p>
+                  </a:txBody>
+                  <a:tcPr marT="91425" marB="91425" marR="91425" marL="91425"/>
+                </a:tc>
+                <a:tc>
+                  <a:txBody>
+                    <a:bodyPr/>
+                    <a:lstStyle/>
+                    <a:p>
+                      <a:pPr indent="0" lvl="0" marL="0" rtl="0" algn="ctr">
+                        <a:spcBef>
+                          <a:spcPts val="0"/>
+                        </a:spcBef>
+                        <a:spcAft>
+                          <a:spcPts val="0"/>
+                        </a:spcAft>
+                        <a:buNone/>
+                      </a:pPr>
+                      <a:r>
+                        <a:t/>
+                      </a:r>
+                      <a:endParaRPr sz="1800"/>
+                    </a:p>
+                    <a:p>
+                      <a:pPr indent="0" lvl="0" marL="0" rtl="0" algn="ctr">
+                        <a:spcBef>
+                          <a:spcPts val="0"/>
+                        </a:spcBef>
+                        <a:spcAft>
+                          <a:spcPts val="0"/>
+                        </a:spcAft>
+                        <a:buNone/>
+                      </a:pPr>
+                      <a:r>
+                        <a:rPr lang="nl-NL" sz="1800"/>
+                        <a:t>Ik worstelde met </a:t>
+                      </a:r>
+                      <a:endParaRPr sz="1800"/>
+                    </a:p>
+                    <a:p>
+                      <a:pPr indent="0" lvl="0" marL="0" rtl="0" algn="ctr">
+                        <a:spcBef>
+                          <a:spcPts val="0"/>
+                        </a:spcBef>
+                        <a:spcAft>
+                          <a:spcPts val="0"/>
+                        </a:spcAft>
+                        <a:buNone/>
+                      </a:pPr>
+                      <a:r>
+                        <a:rPr lang="nl-NL" sz="1800"/>
+                        <a:t>samenwerken.</a:t>
+                      </a:r>
+                      <a:endParaRPr sz="1800"/>
+                    </a:p>
+                  </a:txBody>
+                  <a:tcPr marT="91425" marB="91425" marR="91425" marL="91425"/>
+                </a:tc>
+              </a:tr>
+              <a:tr h="1190100">
+                <a:tc>
+                  <a:txBody>
+                    <a:bodyPr/>
+                    <a:lstStyle/>
+                    <a:p>
+                      <a:pPr indent="0" lvl="0" marL="0" rtl="0" algn="ctr">
+                        <a:spcBef>
+                          <a:spcPts val="0"/>
+                        </a:spcBef>
+                        <a:spcAft>
+                          <a:spcPts val="0"/>
+                        </a:spcAft>
+                        <a:buNone/>
+                      </a:pPr>
+                      <a:r>
+                        <a:rPr lang="nl-NL" sz="1800"/>
+                        <a:t>Ik heb VELE ideeën gedeeld tijdens de activiteit en discussies.</a:t>
+                      </a:r>
+                      <a:endParaRPr sz="1800"/>
+                    </a:p>
+                  </a:txBody>
+                  <a:tcPr marT="91425" marB="91425" marR="91425" marL="91425"/>
+                </a:tc>
+                <a:tc>
+                  <a:txBody>
+                    <a:bodyPr/>
+                    <a:lstStyle/>
+                    <a:p>
+                      <a:pPr indent="0" lvl="0" marL="0" rtl="0" algn="ctr">
+                        <a:spcBef>
+                          <a:spcPts val="0"/>
+                        </a:spcBef>
+                        <a:spcAft>
+                          <a:spcPts val="0"/>
+                        </a:spcAft>
+                        <a:buNone/>
+                      </a:pPr>
+                      <a:r>
+                        <a:rPr lang="nl-NL" sz="1800"/>
+                        <a:t>Ik heb SOMMIGE ideeën gedeeld</a:t>
+                      </a:r>
+                      <a:endParaRPr sz="1800"/>
+                    </a:p>
+                    <a:p>
+                      <a:pPr indent="0" lvl="0" marL="0" rtl="0" algn="ctr">
+                        <a:spcBef>
+                          <a:spcPts val="0"/>
+                        </a:spcBef>
+                        <a:spcAft>
+                          <a:spcPts val="0"/>
+                        </a:spcAft>
+                        <a:buNone/>
+                      </a:pPr>
+                      <a:r>
+                        <a:rPr lang="nl-NL" sz="1800"/>
+                        <a:t>tijdens de activiteit en  discussies.</a:t>
+                      </a:r>
+                      <a:endParaRPr sz="1800"/>
+                    </a:p>
+                  </a:txBody>
+                  <a:tcPr marT="91425" marB="91425" marR="91425" marL="91425"/>
+                </a:tc>
+                <a:tc>
+                  <a:txBody>
+                    <a:bodyPr/>
+                    <a:lstStyle/>
+                    <a:p>
+                      <a:pPr indent="0" lvl="0" marL="0" rtl="0" algn="ctr">
+                        <a:spcBef>
+                          <a:spcPts val="0"/>
+                        </a:spcBef>
+                        <a:spcAft>
+                          <a:spcPts val="0"/>
+                        </a:spcAft>
+                        <a:buNone/>
+                      </a:pPr>
+                      <a:r>
+                        <a:rPr lang="nl-NL" sz="1800"/>
+                        <a:t>Ik heb GEEN ideeën gedeeld tijdens de activiteit en discussies.</a:t>
+                      </a:r>
+                      <a:endParaRPr sz="1800"/>
+                    </a:p>
+                  </a:txBody>
+                  <a:tcPr marT="91425" marB="91425" marR="91425" marL="91425"/>
+                </a:tc>
+              </a:tr>
+            </a:tbl>
+          </a:graphicData>
+        </a:graphic>
+      </p:graphicFrame>
+      <p:sp>
+        <p:nvSpPr>
+          <p:cNvPr id="190" name="Google Shape;190;p22"/>
+          <p:cNvSpPr txBox="1"/>
+          <p:nvPr/>
+        </p:nvSpPr>
+        <p:spPr>
+          <a:xfrm>
+            <a:off x="773425" y="176050"/>
+            <a:ext cx="3006300" cy="550200"/>
+          </a:xfrm>
+          <a:prstGeom prst="rect">
+            <a:avLst/>
+          </a:prstGeom>
+          <a:noFill/>
+          <a:ln>
+            <a:noFill/>
+          </a:ln>
+        </p:spPr>
+        <p:txBody>
+          <a:bodyPr anchorCtr="0" anchor="t" bIns="91425" lIns="91425" spcFirstLastPara="1" rIns="91425" wrap="square" tIns="91425">
+            <a:noAutofit/>
+          </a:bodyPr>
+          <a:lstStyle/>
+          <a:p>
+            <a:pPr indent="0" lvl="0" marL="0" rtl="0" algn="l">
+              <a:spcBef>
+                <a:spcPts val="0"/>
+              </a:spcBef>
+              <a:spcAft>
+                <a:spcPts val="0"/>
+              </a:spcAft>
+              <a:buNone/>
+            </a:pPr>
+            <a:r>
+              <a:rPr b="1" lang="nl-NL" sz="2400">
+                <a:solidFill>
+                  <a:srgbClr val="575656"/>
+                </a:solidFill>
+                <a:latin typeface="Ubuntu"/>
+                <a:ea typeface="Ubuntu"/>
+                <a:cs typeface="Ubuntu"/>
+                <a:sym typeface="Ubuntu"/>
+              </a:rPr>
+              <a:t>Kies één per rij</a:t>
+            </a:r>
+            <a:r>
+              <a:rPr b="1" lang="nl-NL" sz="2400">
+                <a:solidFill>
+                  <a:srgbClr val="575656"/>
+                </a:solidFill>
+                <a:latin typeface="Ubuntu"/>
+                <a:ea typeface="Ubuntu"/>
+                <a:cs typeface="Ubuntu"/>
+                <a:sym typeface="Ubuntu"/>
+              </a:rPr>
+              <a:t> </a:t>
+            </a:r>
+            <a:endParaRPr sz="2400">
+              <a:solidFill>
+                <a:srgbClr val="575656"/>
+              </a:solidFill>
+            </a:endParaRPr>
+          </a:p>
+        </p:txBody>
+      </p:sp>
+      <p:pic>
+        <p:nvPicPr>
+          <p:cNvPr id="191" name="Google Shape;191;p22"/>
+          <p:cNvPicPr preferRelativeResize="0"/>
+          <p:nvPr/>
+        </p:nvPicPr>
+        <p:blipFill rotWithShape="1">
+          <a:blip r:embed="rId3">
+            <a:alphaModFix amt="20000"/>
+          </a:blip>
+          <a:srcRect b="7696" l="0" r="0" t="13038"/>
+          <a:stretch/>
+        </p:blipFill>
+        <p:spPr>
+          <a:xfrm>
+            <a:off x="1103974" y="1293529"/>
+            <a:ext cx="5549200" cy="1466225"/>
+          </a:xfrm>
+          <a:prstGeom prst="rect">
+            <a:avLst/>
+          </a:prstGeom>
+          <a:noFill/>
+          <a:ln>
+            <a:noFill/>
+          </a:ln>
+          <a:effectLst>
+            <a:outerShdw blurRad="57150" rotWithShape="0" algn="bl" dir="5400000" dist="19050">
+              <a:srgbClr val="D0E0E3">
+                <a:alpha val="50000"/>
+              </a:srgbClr>
+            </a:outerShdw>
+          </a:effectLst>
+        </p:spPr>
+      </p:pic>
+      <p:sp>
+        <p:nvSpPr>
+          <p:cNvPr id="192" name="Google Shape;192;p22"/>
+          <p:cNvSpPr txBox="1"/>
+          <p:nvPr/>
+        </p:nvSpPr>
+        <p:spPr>
+          <a:xfrm>
+            <a:off x="3748700" y="206375"/>
+            <a:ext cx="3527100" cy="608100"/>
+          </a:xfrm>
+          <a:prstGeom prst="rect">
+            <a:avLst/>
+          </a:prstGeom>
+          <a:noFill/>
+          <a:ln>
+            <a:noFill/>
+          </a:ln>
+        </p:spPr>
+        <p:txBody>
+          <a:bodyPr anchorCtr="0" anchor="t" bIns="91425" lIns="91425" spcFirstLastPara="1" rIns="91425" wrap="square" tIns="91425">
+            <a:noAutofit/>
+          </a:bodyPr>
+          <a:lstStyle/>
+          <a:p>
+            <a:pPr indent="0" lvl="0" marL="0" rtl="0" algn="l">
+              <a:spcBef>
+                <a:spcPts val="0"/>
+              </a:spcBef>
+              <a:spcAft>
+                <a:spcPts val="0"/>
+              </a:spcAft>
+              <a:buNone/>
+            </a:pPr>
+            <a:r>
+              <a:rPr b="1" lang="nl-NL" sz="1700">
+                <a:latin typeface="Ubuntu"/>
+                <a:ea typeface="Ubuntu"/>
+                <a:cs typeface="Ubuntu"/>
+                <a:sym typeface="Ubuntu"/>
+              </a:rPr>
+              <a:t>Zelfreflectie </a:t>
+            </a:r>
+            <a:endParaRPr b="1" sz="1700">
+              <a:latin typeface="Ubuntu"/>
+              <a:ea typeface="Ubuntu"/>
+              <a:cs typeface="Ubuntu"/>
+              <a:sym typeface="Ubuntu"/>
+            </a:endParaRPr>
+          </a:p>
+        </p:txBody>
+      </p:sp>
+      <p:pic>
+        <p:nvPicPr>
+          <p:cNvPr id="193" name="Google Shape;193;p22"/>
+          <p:cNvPicPr preferRelativeResize="0"/>
+          <p:nvPr/>
+        </p:nvPicPr>
+        <p:blipFill>
+          <a:blip r:embed="rId4">
+            <a:alphaModFix/>
+          </a:blip>
+          <a:stretch>
+            <a:fillRect/>
+          </a:stretch>
+        </p:blipFill>
+        <p:spPr>
+          <a:xfrm>
+            <a:off x="5167525" y="211225"/>
+            <a:ext cx="545374" cy="446000"/>
+          </a:xfrm>
+          <a:prstGeom prst="rect">
+            <a:avLst/>
+          </a:prstGeom>
+          <a:noFill/>
+          <a:ln>
+            <a:noFill/>
+          </a:ln>
+        </p:spPr>
+      </p:pic>
+    </p:spTree>
+  </p:cSld>
+  <p:clrMapOvr>
+    <a:masterClrMapping/>
+  </p:clrMapOvr>
+</p:sld>
+</file>
+
+<file path=ppt/slides/slide11.xml><?xml version="1.0" encoding="utf-8"?>
+<p:sld xmlns:a="http://schemas.openxmlformats.org/drawingml/2006/main" xmlns:r="http://schemas.openxmlformats.org/officeDocument/2006/relationships" xmlns:mc="http://schemas.openxmlformats.org/markup-compatibility/2006" xmlns:mv="urn:schemas-microsoft-com:mac:vml" xmlns:p="http://schemas.openxmlformats.org/presentationml/2006/main" xmlns:c="http://schemas.openxmlformats.org/drawingml/2006/chart" xmlns:dgm="http://schemas.openxmlformats.org/drawingml/2006/diagram" xmlns:o="urn:schemas-microsoft-com:office:office" xmlns:v="urn:schemas-microsoft-com:vml" xmlns:pvml="urn:schemas-microsoft-com:office:powerpoint" xmlns:com="http://schemas.openxmlformats.org/drawingml/2006/compatibility" xmlns:p14="http://schemas.microsoft.com/office/powerpoint/2010/main" xmlns:p15="http://schemas.microsoft.com/office/powerpoint/2012/main">
+  <p:cSld>
+    <p:spTree>
+      <p:nvGrpSpPr>
+        <p:cNvPr id="197" name="Shape 197"/>
+        <p:cNvGrpSpPr/>
+        <p:nvPr/>
+      </p:nvGrpSpPr>
+      <p:grpSpPr>
+        <a:xfrm>
+          <a:off x="0" y="0"/>
+          <a:ext cx="0" cy="0"/>
+          <a:chOff x="0" y="0"/>
+          <a:chExt cx="0" cy="0"/>
+        </a:xfrm>
+      </p:grpSpPr>
+      <p:pic>
+        <p:nvPicPr>
+          <p:cNvPr id="198" name="Google Shape;198;p23"/>
+          <p:cNvPicPr preferRelativeResize="0"/>
+          <p:nvPr/>
+        </p:nvPicPr>
+        <p:blipFill>
+          <a:blip r:embed="rId3">
+            <a:alphaModFix/>
+          </a:blip>
+          <a:stretch>
+            <a:fillRect/>
+          </a:stretch>
+        </p:blipFill>
+        <p:spPr>
+          <a:xfrm>
+            <a:off x="-91746" y="116478"/>
+            <a:ext cx="7564649" cy="10674544"/>
+          </a:xfrm>
+          <a:prstGeom prst="rect">
+            <a:avLst/>
+          </a:prstGeom>
+          <a:noFill/>
+          <a:ln>
+            <a:noFill/>
+          </a:ln>
+        </p:spPr>
+      </p:pic>
+      <p:pic>
+        <p:nvPicPr>
+          <p:cNvPr id="199" name="Google Shape;199;p23"/>
+          <p:cNvPicPr preferRelativeResize="0"/>
+          <p:nvPr/>
+        </p:nvPicPr>
+        <p:blipFill rotWithShape="1">
+          <a:blip r:embed="rId4">
+            <a:alphaModFix/>
+          </a:blip>
+          <a:srcRect b="0" l="21521" r="13361" t="7715"/>
+          <a:stretch/>
+        </p:blipFill>
+        <p:spPr>
+          <a:xfrm>
+            <a:off x="343950" y="7579504"/>
+            <a:ext cx="1859284" cy="2497791"/>
+          </a:xfrm>
+          <a:prstGeom prst="rect">
+            <a:avLst/>
+          </a:prstGeom>
+          <a:noFill/>
+          <a:ln>
+            <a:noFill/>
+          </a:ln>
+        </p:spPr>
+      </p:pic>
+      <p:pic>
+        <p:nvPicPr>
+          <p:cNvPr id="200" name="Google Shape;200;p23"/>
+          <p:cNvPicPr preferRelativeResize="0"/>
+          <p:nvPr/>
+        </p:nvPicPr>
+        <p:blipFill>
+          <a:blip r:embed="rId5">
+            <a:alphaModFix/>
+          </a:blip>
+          <a:stretch>
+            <a:fillRect/>
+          </a:stretch>
+        </p:blipFill>
+        <p:spPr>
+          <a:xfrm>
+            <a:off x="4751966" y="7754393"/>
+            <a:ext cx="2240934" cy="940435"/>
+          </a:xfrm>
+          <a:prstGeom prst="rect">
+            <a:avLst/>
+          </a:prstGeom>
+          <a:noFill/>
+          <a:ln>
+            <a:noFill/>
+          </a:ln>
+        </p:spPr>
+      </p:pic>
+      <p:pic>
+        <p:nvPicPr>
+          <p:cNvPr id="201" name="Google Shape;201;p23"/>
+          <p:cNvPicPr preferRelativeResize="0"/>
+          <p:nvPr/>
+        </p:nvPicPr>
+        <p:blipFill>
+          <a:blip r:embed="rId6">
+            <a:alphaModFix/>
+          </a:blip>
+          <a:stretch>
+            <a:fillRect/>
+          </a:stretch>
+        </p:blipFill>
+        <p:spPr>
+          <a:xfrm>
+            <a:off x="2111784" y="7926758"/>
+            <a:ext cx="2240902" cy="595717"/>
+          </a:xfrm>
+          <a:prstGeom prst="rect">
+            <a:avLst/>
+          </a:prstGeom>
+          <a:noFill/>
+          <a:ln>
+            <a:noFill/>
+          </a:ln>
+        </p:spPr>
+      </p:pic>
+      <p:pic>
+        <p:nvPicPr>
+          <p:cNvPr id="202" name="Google Shape;202;p23"/>
+          <p:cNvPicPr preferRelativeResize="0"/>
+          <p:nvPr/>
+        </p:nvPicPr>
+        <p:blipFill>
+          <a:blip r:embed="rId7">
+            <a:alphaModFix/>
+          </a:blip>
+          <a:stretch>
+            <a:fillRect/>
+          </a:stretch>
+        </p:blipFill>
+        <p:spPr>
+          <a:xfrm>
+            <a:off x="2218111" y="8917721"/>
+            <a:ext cx="2028252" cy="860473"/>
+          </a:xfrm>
+          <a:prstGeom prst="rect">
+            <a:avLst/>
+          </a:prstGeom>
+          <a:noFill/>
+          <a:ln>
+            <a:noFill/>
+          </a:ln>
+        </p:spPr>
+      </p:pic>
+      <p:pic>
+        <p:nvPicPr>
+          <p:cNvPr id="203" name="Google Shape;203;p23"/>
+          <p:cNvPicPr preferRelativeResize="0"/>
+          <p:nvPr/>
+        </p:nvPicPr>
+        <p:blipFill>
+          <a:blip r:embed="rId8">
+            <a:alphaModFix/>
+          </a:blip>
+          <a:stretch>
+            <a:fillRect/>
+          </a:stretch>
+        </p:blipFill>
+        <p:spPr>
+          <a:xfrm>
+            <a:off x="4587906" y="8917737"/>
+            <a:ext cx="2569044" cy="595716"/>
+          </a:xfrm>
+          <a:prstGeom prst="rect">
+            <a:avLst/>
+          </a:prstGeom>
+          <a:noFill/>
+          <a:ln>
+            <a:noFill/>
+          </a:ln>
+        </p:spPr>
+      </p:pic>
+      <p:pic>
+        <p:nvPicPr>
+          <p:cNvPr id="204" name="Google Shape;204;p23"/>
+          <p:cNvPicPr preferRelativeResize="0"/>
+          <p:nvPr/>
+        </p:nvPicPr>
+        <p:blipFill>
+          <a:blip r:embed="rId9">
+            <a:alphaModFix/>
+          </a:blip>
+          <a:stretch>
+            <a:fillRect/>
+          </a:stretch>
+        </p:blipFill>
+        <p:spPr>
+          <a:xfrm>
+            <a:off x="572550" y="3254900"/>
+            <a:ext cx="2752725" cy="952500"/>
+          </a:xfrm>
+          <a:prstGeom prst="rect">
+            <a:avLst/>
+          </a:prstGeom>
+          <a:noFill/>
+          <a:ln>
+            <a:noFill/>
+          </a:ln>
+        </p:spPr>
+      </p:pic>
+      <p:sp>
+        <p:nvSpPr>
+          <p:cNvPr id="205" name="Google Shape;205;p23"/>
+          <p:cNvSpPr txBox="1"/>
+          <p:nvPr/>
+        </p:nvSpPr>
+        <p:spPr>
+          <a:xfrm>
+            <a:off x="572550" y="1485175"/>
+            <a:ext cx="5045100" cy="4034100"/>
+          </a:xfrm>
+          <a:prstGeom prst="rect">
+            <a:avLst/>
+          </a:prstGeom>
+          <a:noFill/>
+          <a:ln>
+            <a:noFill/>
+          </a:ln>
+        </p:spPr>
+        <p:txBody>
+          <a:bodyPr anchorCtr="0" anchor="ctr" bIns="91425" lIns="91425" spcFirstLastPara="1" rIns="91425" wrap="square" tIns="91425">
+            <a:noAutofit/>
+          </a:bodyPr>
+          <a:lstStyle/>
+          <a:p>
+            <a:pPr indent="0" lvl="0" marL="0" rtl="0" algn="l">
+              <a:spcBef>
+                <a:spcPts val="0"/>
+              </a:spcBef>
+              <a:spcAft>
+                <a:spcPts val="0"/>
+              </a:spcAft>
+              <a:buNone/>
+            </a:pPr>
+            <a:r>
+              <a:rPr lang="nl-NL" sz="2000">
+                <a:latin typeface="Cabin"/>
+                <a:ea typeface="Cabin"/>
+                <a:cs typeface="Cabin"/>
+                <a:sym typeface="Cabin"/>
+              </a:rPr>
+              <a:t>Versie 1.0, Mei 2020</a:t>
+            </a:r>
+            <a:endParaRPr sz="2000">
+              <a:latin typeface="Cabin"/>
+              <a:ea typeface="Cabin"/>
+              <a:cs typeface="Cabin"/>
+              <a:sym typeface="Cabin"/>
+            </a:endParaRPr>
+          </a:p>
+          <a:p>
+            <a:pPr indent="0" lvl="0" marL="0" rtl="0" algn="l">
+              <a:spcBef>
+                <a:spcPts val="0"/>
+              </a:spcBef>
+              <a:spcAft>
+                <a:spcPts val="0"/>
+              </a:spcAft>
+              <a:buNone/>
+            </a:pPr>
+            <a:r>
+              <a:rPr lang="nl-NL" sz="2000">
+                <a:latin typeface="Cabin"/>
+                <a:ea typeface="Cabin"/>
+                <a:cs typeface="Cabin"/>
+                <a:sym typeface="Cabin"/>
+              </a:rPr>
+              <a:t>Dit document werd ontwikkeld door </a:t>
+            </a:r>
+            <a:r>
+              <a:rPr b="1" lang="nl-NL" sz="2000">
+                <a:latin typeface="Cabin"/>
+                <a:ea typeface="Cabin"/>
+                <a:cs typeface="Cabin"/>
+                <a:sym typeface="Cabin"/>
+              </a:rPr>
+              <a:t>Maria-Cristina Ciocci </a:t>
+            </a:r>
+            <a:endParaRPr b="1" sz="2000">
+              <a:latin typeface="Cabin"/>
+              <a:ea typeface="Cabin"/>
+              <a:cs typeface="Cabin"/>
+              <a:sym typeface="Cabin"/>
+            </a:endParaRPr>
+          </a:p>
+          <a:p>
+            <a:pPr indent="0" lvl="0" marL="0" rtl="0" algn="l">
+              <a:spcBef>
+                <a:spcPts val="0"/>
+              </a:spcBef>
+              <a:spcAft>
+                <a:spcPts val="0"/>
+              </a:spcAft>
+              <a:buNone/>
+            </a:pPr>
+            <a:r>
+              <a:rPr lang="nl-NL" sz="2000">
+                <a:latin typeface="Cabin"/>
+                <a:ea typeface="Cabin"/>
+                <a:cs typeface="Cabin"/>
+                <a:sym typeface="Cabin"/>
+              </a:rPr>
+              <a:t>en valt onder de Creative Commons licentie</a:t>
+            </a:r>
+            <a:endParaRPr sz="2000">
+              <a:latin typeface="Cabin"/>
+              <a:ea typeface="Cabin"/>
+              <a:cs typeface="Cabin"/>
+              <a:sym typeface="Cabin"/>
+            </a:endParaRPr>
+          </a:p>
+          <a:p>
+            <a:pPr indent="0" lvl="0" marL="0" rtl="0" algn="l">
+              <a:spcBef>
+                <a:spcPts val="0"/>
+              </a:spcBef>
+              <a:spcAft>
+                <a:spcPts val="0"/>
+              </a:spcAft>
+              <a:buNone/>
+            </a:pPr>
+            <a:r>
+              <a:t/>
+            </a:r>
+            <a:endParaRPr sz="2000">
+              <a:latin typeface="Cabin"/>
+              <a:ea typeface="Cabin"/>
+              <a:cs typeface="Cabin"/>
+              <a:sym typeface="Cabin"/>
+            </a:endParaRPr>
+          </a:p>
+          <a:p>
+            <a:pPr indent="0" lvl="0" marL="0" rtl="0" algn="l">
+              <a:spcBef>
+                <a:spcPts val="0"/>
+              </a:spcBef>
+              <a:spcAft>
+                <a:spcPts val="0"/>
+              </a:spcAft>
+              <a:buNone/>
+            </a:pPr>
+            <a:r>
+              <a:t/>
+            </a:r>
+            <a:endParaRPr sz="2000">
+              <a:latin typeface="Cabin"/>
+              <a:ea typeface="Cabin"/>
+              <a:cs typeface="Cabin"/>
+              <a:sym typeface="Cabin"/>
+            </a:endParaRPr>
+          </a:p>
+          <a:p>
+            <a:pPr indent="0" lvl="0" marL="0" rtl="0" algn="l">
+              <a:spcBef>
+                <a:spcPts val="0"/>
+              </a:spcBef>
+              <a:spcAft>
+                <a:spcPts val="0"/>
+              </a:spcAft>
+              <a:buNone/>
+            </a:pPr>
+            <a:r>
+              <a:t/>
+            </a:r>
+            <a:endParaRPr sz="2000">
+              <a:latin typeface="Cabin"/>
+              <a:ea typeface="Cabin"/>
+              <a:cs typeface="Cabin"/>
+              <a:sym typeface="Cabin"/>
+            </a:endParaRPr>
+          </a:p>
+          <a:p>
+            <a:pPr indent="0" lvl="0" marL="0" rtl="0" algn="l">
+              <a:spcBef>
+                <a:spcPts val="0"/>
+              </a:spcBef>
+              <a:spcAft>
+                <a:spcPts val="0"/>
+              </a:spcAft>
+              <a:buNone/>
+            </a:pPr>
+            <a:r>
+              <a:t/>
+            </a:r>
+            <a:endParaRPr sz="2000">
+              <a:latin typeface="Cabin"/>
+              <a:ea typeface="Cabin"/>
+              <a:cs typeface="Cabin"/>
+              <a:sym typeface="Cabin"/>
+            </a:endParaRPr>
+          </a:p>
+          <a:p>
+            <a:pPr indent="0" lvl="0" marL="0" rtl="0" algn="l">
+              <a:spcBef>
+                <a:spcPts val="0"/>
+              </a:spcBef>
+              <a:spcAft>
+                <a:spcPts val="0"/>
+              </a:spcAft>
+              <a:buNone/>
+            </a:pPr>
+            <a:r>
+              <a:t/>
+            </a:r>
+            <a:endParaRPr sz="2000">
+              <a:latin typeface="Cabin"/>
+              <a:ea typeface="Cabin"/>
+              <a:cs typeface="Cabin"/>
+              <a:sym typeface="Cabin"/>
+            </a:endParaRPr>
+          </a:p>
+          <a:p>
+            <a:pPr indent="0" lvl="0" marL="0" rtl="0" algn="l">
+              <a:spcBef>
+                <a:spcPts val="0"/>
+              </a:spcBef>
+              <a:spcAft>
+                <a:spcPts val="0"/>
+              </a:spcAft>
+              <a:buNone/>
+            </a:pPr>
+            <a:r>
+              <a:t/>
+            </a:r>
+            <a:endParaRPr sz="2000">
+              <a:latin typeface="Cabin"/>
+              <a:ea typeface="Cabin"/>
+              <a:cs typeface="Cabin"/>
+              <a:sym typeface="Cabin"/>
+            </a:endParaRPr>
+          </a:p>
+          <a:p>
+            <a:pPr indent="0" lvl="0" marL="0" rtl="0" algn="l">
+              <a:spcBef>
+                <a:spcPts val="0"/>
+              </a:spcBef>
+              <a:spcAft>
+                <a:spcPts val="0"/>
+              </a:spcAft>
+              <a:buNone/>
+            </a:pPr>
+            <a:r>
+              <a:t/>
+            </a:r>
+            <a:endParaRPr sz="2000">
+              <a:latin typeface="Cabin"/>
+              <a:ea typeface="Cabin"/>
+              <a:cs typeface="Cabin"/>
+              <a:sym typeface="Cabin"/>
+            </a:endParaRPr>
+          </a:p>
+          <a:p>
+            <a:pPr indent="0" lvl="0" marL="0" rtl="0" algn="l">
+              <a:spcBef>
+                <a:spcPts val="0"/>
+              </a:spcBef>
+              <a:spcAft>
+                <a:spcPts val="0"/>
+              </a:spcAft>
+              <a:buNone/>
+            </a:pPr>
+            <a:r>
+              <a:rPr lang="nl-NL" sz="2000">
+                <a:latin typeface="Cabin"/>
+                <a:ea typeface="Cabin"/>
+                <a:cs typeface="Cabin"/>
+                <a:sym typeface="Cabin"/>
+              </a:rPr>
+              <a:t>www.maakbib.be</a:t>
+            </a:r>
+            <a:endParaRPr sz="2000">
+              <a:latin typeface="Cabin"/>
+              <a:ea typeface="Cabin"/>
+              <a:cs typeface="Cabin"/>
+              <a:sym typeface="Cabin"/>
+            </a:endParaRPr>
+          </a:p>
+          <a:p>
+            <a:pPr indent="0" lvl="0" marL="0" rtl="0" algn="l">
+              <a:spcBef>
+                <a:spcPts val="0"/>
+              </a:spcBef>
+              <a:spcAft>
+                <a:spcPts val="0"/>
+              </a:spcAft>
+              <a:buNone/>
+            </a:pPr>
+            <a:r>
+              <a:rPr lang="nl-NL" sz="2000">
+                <a:latin typeface="Cabin"/>
+                <a:ea typeface="Cabin"/>
+                <a:cs typeface="Cabin"/>
+                <a:sym typeface="Cabin"/>
+              </a:rPr>
+              <a:t>www.decreatievestem.be</a:t>
+            </a:r>
+            <a:endParaRPr sz="2000">
+              <a:latin typeface="Cabin"/>
+              <a:ea typeface="Cabin"/>
+              <a:cs typeface="Cabin"/>
+              <a:sym typeface="Cabin"/>
+            </a:endParaRPr>
+          </a:p>
+          <a:p>
+            <a:pPr indent="0" lvl="0" marL="0" rtl="0" algn="l">
+              <a:spcBef>
+                <a:spcPts val="0"/>
+              </a:spcBef>
+              <a:spcAft>
+                <a:spcPts val="0"/>
+              </a:spcAft>
+              <a:buNone/>
+            </a:pPr>
+            <a:r>
+              <a:rPr lang="nl-NL" sz="2000">
+                <a:latin typeface="Cabin"/>
+                <a:ea typeface="Cabin"/>
+                <a:cs typeface="Cabin"/>
+                <a:sym typeface="Cabin"/>
+              </a:rPr>
+              <a:t>www.vlaio.be/nl</a:t>
+            </a:r>
+            <a:br>
+              <a:rPr lang="nl-NL" sz="2000">
+                <a:latin typeface="Cabin"/>
+                <a:ea typeface="Cabin"/>
+                <a:cs typeface="Cabin"/>
+                <a:sym typeface="Cabin"/>
+              </a:rPr>
+            </a:br>
+            <a:r>
+              <a:rPr lang="nl-NL" sz="2000">
+                <a:uFill>
+                  <a:noFill/>
+                </a:uFill>
+                <a:latin typeface="Cabin"/>
+                <a:ea typeface="Cabin"/>
+                <a:cs typeface="Cabin"/>
+                <a:sym typeface="Cabin"/>
+                <a:hlinkClick r:id="rId10"/>
+              </a:rPr>
+              <a:t>www.stem-</a:t>
+            </a:r>
+            <a:r>
+              <a:rPr lang="nl-NL" sz="2000">
+                <a:latin typeface="Cabin"/>
+                <a:ea typeface="Cabin"/>
+                <a:cs typeface="Cabin"/>
+                <a:sym typeface="Cabin"/>
+              </a:rPr>
+              <a:t>acad</a:t>
+            </a:r>
+            <a:r>
+              <a:rPr lang="nl-NL" sz="2000">
+                <a:uFill>
+                  <a:noFill/>
+                </a:uFill>
+                <a:latin typeface="Cabin"/>
+                <a:ea typeface="Cabin"/>
+                <a:cs typeface="Cabin"/>
+                <a:sym typeface="Cabin"/>
+                <a:hlinkClick r:id="rId11"/>
+              </a:rPr>
+              <a:t>emie.b</a:t>
+            </a:r>
+            <a:r>
+              <a:rPr lang="nl-NL" sz="2000">
+                <a:latin typeface="Cabin"/>
+                <a:ea typeface="Cabin"/>
+                <a:cs typeface="Cabin"/>
+                <a:sym typeface="Cabin"/>
+              </a:rPr>
+              <a:t>e</a:t>
+            </a:r>
+            <a:endParaRPr sz="2000">
+              <a:latin typeface="Cabin"/>
+              <a:ea typeface="Cabin"/>
+              <a:cs typeface="Cabin"/>
+              <a:sym typeface="Cabin"/>
+            </a:endParaRPr>
+          </a:p>
+        </p:txBody>
+      </p:sp>
+    </p:spTree>
+  </p:cSld>
+  <p:clrMapOvr>
+    <a:masterClrMapping/>
+  </p:clrMapOvr>
+</p:sld>
+</file>
+
+<file path=ppt/slides/slide12.xml><?xml version="1.0" encoding="utf-8"?>
+<p:sld xmlns:a="http://schemas.openxmlformats.org/drawingml/2006/main" xmlns:r="http://schemas.openxmlformats.org/officeDocument/2006/relationships" xmlns:mc="http://schemas.openxmlformats.org/markup-compatibility/2006" xmlns:mv="urn:schemas-microsoft-com:mac:vml" xmlns:p="http://schemas.openxmlformats.org/presentationml/2006/main" xmlns:c="http://schemas.openxmlformats.org/drawingml/2006/chart" xmlns:dgm="http://schemas.openxmlformats.org/drawingml/2006/diagram" xmlns:o="urn:schemas-microsoft-com:office:office" xmlns:v="urn:schemas-microsoft-com:vml" xmlns:pvml="urn:schemas-microsoft-com:office:powerpoint" xmlns:com="http://schemas.openxmlformats.org/drawingml/2006/compatibility" xmlns:p14="http://schemas.microsoft.com/office/powerpoint/2010/main" xmlns:p15="http://schemas.microsoft.com/office/powerpoint/2012/main">
+  <p:cSld>
+    <p:spTree>
+      <p:nvGrpSpPr>
+        <p:cNvPr id="209" name="Shape 209"/>
+        <p:cNvGrpSpPr/>
+        <p:nvPr/>
+      </p:nvGrpSpPr>
+      <p:grpSpPr>
+        <a:xfrm>
+          <a:off x="0" y="0"/>
+          <a:ext cx="0" cy="0"/>
+          <a:chOff x="0" y="0"/>
+          <a:chExt cx="0" cy="0"/>
+        </a:xfrm>
+      </p:grpSpPr>
+      <p:pic>
+        <p:nvPicPr>
+          <p:cNvPr id="210" name="Google Shape;210;p24"/>
+          <p:cNvPicPr preferRelativeResize="0"/>
+          <p:nvPr/>
+        </p:nvPicPr>
+        <p:blipFill>
+          <a:blip r:embed="rId3">
+            <a:alphaModFix/>
+          </a:blip>
+          <a:stretch>
+            <a:fillRect/>
+          </a:stretch>
+        </p:blipFill>
+        <p:spPr>
+          <a:xfrm>
+            <a:off x="-91746" y="116478"/>
+            <a:ext cx="7564649" cy="10674544"/>
+          </a:xfrm>
+          <a:prstGeom prst="rect">
+            <a:avLst/>
+          </a:prstGeom>
+          <a:noFill/>
+          <a:ln>
+            <a:noFill/>
+          </a:ln>
+        </p:spPr>
+      </p:pic>
+      <p:sp>
+        <p:nvSpPr>
+          <p:cNvPr id="211" name="Google Shape;211;p24"/>
+          <p:cNvSpPr txBox="1"/>
+          <p:nvPr/>
+        </p:nvSpPr>
+        <p:spPr>
+          <a:xfrm>
+            <a:off x="674688" y="9207100"/>
+            <a:ext cx="6210300" cy="550200"/>
+          </a:xfrm>
+          <a:prstGeom prst="rect">
+            <a:avLst/>
+          </a:prstGeom>
+          <a:noFill/>
+          <a:ln>
+            <a:noFill/>
+          </a:ln>
+        </p:spPr>
+        <p:txBody>
+          <a:bodyPr anchorCtr="0" anchor="t" bIns="91425" lIns="91425" spcFirstLastPara="1" rIns="91425" wrap="square" tIns="91425">
+            <a:noAutofit/>
+          </a:bodyPr>
+          <a:lstStyle/>
+          <a:p>
+            <a:pPr indent="0" lvl="0" marL="0" rtl="0" algn="l">
+              <a:spcBef>
+                <a:spcPts val="0"/>
+              </a:spcBef>
+              <a:spcAft>
+                <a:spcPts val="0"/>
+              </a:spcAft>
+              <a:buNone/>
+            </a:pPr>
+            <a:r>
+              <a:rPr b="1" lang="nl-NL" sz="3600">
+                <a:solidFill>
+                  <a:srgbClr val="575656"/>
+                </a:solidFill>
+                <a:latin typeface="Ubuntu"/>
+                <a:ea typeface="Ubuntu"/>
+                <a:cs typeface="Ubuntu"/>
+                <a:sym typeface="Ubuntu"/>
+              </a:rPr>
+              <a:t>Je kan meer dan je denkt!</a:t>
+            </a:r>
+            <a:endParaRPr sz="3600">
+              <a:solidFill>
+                <a:srgbClr val="575656"/>
+              </a:solidFill>
+            </a:endParaRPr>
+          </a:p>
+        </p:txBody>
+      </p:sp>
+      <p:pic>
+        <p:nvPicPr>
+          <p:cNvPr id="212" name="Google Shape;212;p24"/>
+          <p:cNvPicPr preferRelativeResize="0"/>
+          <p:nvPr/>
+        </p:nvPicPr>
+        <p:blipFill>
+          <a:blip r:embed="rId4">
+            <a:alphaModFix amt="39000"/>
+          </a:blip>
+          <a:stretch>
+            <a:fillRect/>
+          </a:stretch>
+        </p:blipFill>
+        <p:spPr>
+          <a:xfrm>
+            <a:off x="1622425" y="1069175"/>
+            <a:ext cx="4314825" cy="8096250"/>
+          </a:xfrm>
+          <a:prstGeom prst="rect">
+            <a:avLst/>
+          </a:prstGeom>
+          <a:noFill/>
+          <a:ln>
+            <a:noFill/>
+          </a:ln>
+        </p:spPr>
+      </p:pic>
+    </p:spTree>
+  </p:cSld>
+  <p:clrMapOvr>
+    <a:masterClrMapping/>
+  </p:clrMapOvr>
+</p:sld>
+</file>
+
+<file path=ppt/slides/slide2.xml><?xml version="1.0" encoding="utf-8"?>
+<p:sld xmlns:a="http://schemas.openxmlformats.org/drawingml/2006/main" xmlns:r="http://schemas.openxmlformats.org/officeDocument/2006/relationships" xmlns:mc="http://schemas.openxmlformats.org/markup-compatibility/2006" xmlns:mv="urn:schemas-microsoft-com:mac:vml" xmlns:p="http://schemas.openxmlformats.org/presentationml/2006/main" xmlns:c="http://schemas.openxmlformats.org/drawingml/2006/chart" xmlns:dgm="http://schemas.openxmlformats.org/drawingml/2006/diagram" xmlns:o="urn:schemas-microsoft-com:office:office" xmlns:v="urn:schemas-microsoft-com:vml" xmlns:pvml="urn:schemas-microsoft-com:office:powerpoint" xmlns:com="http://schemas.openxmlformats.org/drawingml/2006/compatibility" xmlns:p14="http://schemas.microsoft.com/office/powerpoint/2010/main" xmlns:p15="http://schemas.microsoft.com/office/powerpoint/2012/main">
+  <p:cSld>
+    <p:spTree>
+      <p:nvGrpSpPr>
+        <p:cNvPr id="92" name="Shape 92"/>
+        <p:cNvGrpSpPr/>
+        <p:nvPr/>
+      </p:nvGrpSpPr>
+      <p:grpSpPr>
+        <a:xfrm>
+          <a:off x="0" y="0"/>
+          <a:ext cx="0" cy="0"/>
+          <a:chOff x="0" y="0"/>
+          <a:chExt cx="0" cy="0"/>
+        </a:xfrm>
+      </p:grpSpPr>
+      <p:pic>
+        <p:nvPicPr>
+          <p:cNvPr id="93" name="Google Shape;93;p14"/>
+          <p:cNvPicPr preferRelativeResize="0"/>
+          <p:nvPr/>
+        </p:nvPicPr>
+        <p:blipFill>
+          <a:blip r:embed="rId3">
+            <a:alphaModFix/>
+          </a:blip>
+          <a:stretch>
+            <a:fillRect/>
+          </a:stretch>
+        </p:blipFill>
+        <p:spPr>
+          <a:xfrm>
+            <a:off x="-91746" y="116478"/>
+            <a:ext cx="7564649" cy="10674544"/>
+          </a:xfrm>
+          <a:prstGeom prst="rect">
+            <a:avLst/>
+          </a:prstGeom>
+          <a:noFill/>
+          <a:ln>
+            <a:noFill/>
+          </a:ln>
+        </p:spPr>
+      </p:pic>
+    </p:spTree>
+  </p:cSld>
+  <p:clrMapOvr>
+    <a:masterClrMapping/>
+  </p:clrMapOvr>
+</p:sld>
+</file>
+
+<file path=ppt/slides/slide3.xml><?xml version="1.0" encoding="utf-8"?>
+<p:sld xmlns:a="http://schemas.openxmlformats.org/drawingml/2006/main" xmlns:r="http://schemas.openxmlformats.org/officeDocument/2006/relationships" xmlns:mc="http://schemas.openxmlformats.org/markup-compatibility/2006" xmlns:mv="urn:schemas-microsoft-com:mac:vml" xmlns:p="http://schemas.openxmlformats.org/presentationml/2006/main" xmlns:c="http://schemas.openxmlformats.org/drawingml/2006/chart" xmlns:dgm="http://schemas.openxmlformats.org/drawingml/2006/diagram" xmlns:o="urn:schemas-microsoft-com:office:office" xmlns:v="urn:schemas-microsoft-com:vml" xmlns:pvml="urn:schemas-microsoft-com:office:powerpoint" xmlns:com="http://schemas.openxmlformats.org/drawingml/2006/compatibility" xmlns:p14="http://schemas.microsoft.com/office/powerpoint/2010/main" xmlns:p15="http://schemas.microsoft.com/office/powerpoint/2012/main">
+  <p:cSld>
+    <p:spTree>
+      <p:nvGrpSpPr>
+        <p:cNvPr id="97" name="Shape 97"/>
+        <p:cNvGrpSpPr/>
+        <p:nvPr/>
+      </p:nvGrpSpPr>
+      <p:grpSpPr>
+        <a:xfrm>
+          <a:off x="0" y="0"/>
+          <a:ext cx="0" cy="0"/>
+          <a:chOff x="0" y="0"/>
+          <a:chExt cx="0" cy="0"/>
+        </a:xfrm>
+      </p:grpSpPr>
+      <p:pic>
+        <p:nvPicPr>
+          <p:cNvPr id="98" name="Google Shape;98;p15"/>
+          <p:cNvPicPr preferRelativeResize="0"/>
+          <p:nvPr/>
+        </p:nvPicPr>
+        <p:blipFill rotWithShape="1">
+          <a:blip r:embed="rId3">
+            <a:alphaModFix/>
+          </a:blip>
+          <a:srcRect b="0" l="-2312" r="0" t="0"/>
+          <a:stretch/>
+        </p:blipFill>
+        <p:spPr>
+          <a:xfrm>
+            <a:off x="74488" y="1666350"/>
+            <a:ext cx="7410698" cy="6871001"/>
+          </a:xfrm>
+          <a:prstGeom prst="rect">
+            <a:avLst/>
+          </a:prstGeom>
+          <a:noFill/>
+          <a:ln>
+            <a:noFill/>
+          </a:ln>
+        </p:spPr>
+      </p:pic>
+      <p:pic>
+        <p:nvPicPr>
+          <p:cNvPr id="99" name="Google Shape;99;p15"/>
+          <p:cNvPicPr preferRelativeResize="0"/>
+          <p:nvPr/>
+        </p:nvPicPr>
+        <p:blipFill>
+          <a:blip r:embed="rId4">
+            <a:alphaModFix/>
+          </a:blip>
+          <a:stretch>
+            <a:fillRect/>
+          </a:stretch>
+        </p:blipFill>
+        <p:spPr>
+          <a:xfrm>
+            <a:off x="5680737" y="9646476"/>
+            <a:ext cx="1486975" cy="461599"/>
+          </a:xfrm>
+          <a:prstGeom prst="rect">
+            <a:avLst/>
+          </a:prstGeom>
+          <a:noFill/>
+          <a:ln>
+            <a:noFill/>
+          </a:ln>
+        </p:spPr>
+      </p:pic>
+    </p:spTree>
+  </p:cSld>
+  <p:clrMapOvr>
+    <a:masterClrMapping/>
+  </p:clrMapOvr>
+</p:sld>
+</file>
+
+<file path=ppt/slides/slide4.xml><?xml version="1.0" encoding="utf-8"?>
+<p:sld xmlns:a="http://schemas.openxmlformats.org/drawingml/2006/main" xmlns:r="http://schemas.openxmlformats.org/officeDocument/2006/relationships" xmlns:mc="http://schemas.openxmlformats.org/markup-compatibility/2006" xmlns:mv="urn:schemas-microsoft-com:mac:vml" xmlns:p="http://schemas.openxmlformats.org/presentationml/2006/main" xmlns:c="http://schemas.openxmlformats.org/drawingml/2006/chart" xmlns:dgm="http://schemas.openxmlformats.org/drawingml/2006/diagram" xmlns:o="urn:schemas-microsoft-com:office:office" xmlns:v="urn:schemas-microsoft-com:vml" xmlns:pvml="urn:schemas-microsoft-com:office:powerpoint" xmlns:com="http://schemas.openxmlformats.org/drawingml/2006/compatibility" xmlns:p14="http://schemas.microsoft.com/office/powerpoint/2010/main" xmlns:p15="http://schemas.microsoft.com/office/powerpoint/2012/main">
+  <p:cSld>
+    <p:spTree>
+      <p:nvGrpSpPr>
+        <p:cNvPr id="103" name="Shape 103"/>
+        <p:cNvGrpSpPr/>
+        <p:nvPr/>
+      </p:nvGrpSpPr>
+      <p:grpSpPr>
+        <a:xfrm>
+          <a:off x="0" y="0"/>
+          <a:ext cx="0" cy="0"/>
+          <a:chOff x="0" y="0"/>
+          <a:chExt cx="0" cy="0"/>
+        </a:xfrm>
+      </p:grpSpPr>
+      <p:pic>
+        <p:nvPicPr>
+          <p:cNvPr id="104" name="Google Shape;104;p16"/>
+          <p:cNvPicPr preferRelativeResize="0"/>
+          <p:nvPr/>
+        </p:nvPicPr>
         <p:blipFill rotWithShape="1">
           <a:blip r:embed="rId3">
             <a:alphaModFix/>
@@ -11486,7 +14361,7 @@
         </p:blipFill>
         <p:spPr>
           <a:xfrm>
-            <a:off x="2783463" y="1272576"/>
+            <a:off x="2935863" y="1272576"/>
             <a:ext cx="3928048" cy="1414425"/>
           </a:xfrm>
           <a:prstGeom prst="rect">
@@ -11500,13 +14375,13 @@
       </p:pic>
       <p:sp>
         <p:nvSpPr>
-          <p:cNvPr id="85" name="Google Shape;85;p13"/>
+          <p:cNvPr id="105" name="Google Shape;105;p16"/>
           <p:cNvSpPr txBox="1"/>
           <p:nvPr/>
         </p:nvSpPr>
         <p:spPr>
           <a:xfrm>
-            <a:off x="2076385" y="142560"/>
+            <a:off x="2228785" y="142560"/>
             <a:ext cx="4615500" cy="877200"/>
           </a:xfrm>
           <a:prstGeom prst="rect">
@@ -11565,7 +14440,7 @@
       </p:sp>
       <p:pic>
         <p:nvPicPr>
-          <p:cNvPr id="86" name="Google Shape;86;p13"/>
+          <p:cNvPr id="106" name="Google Shape;106;p16"/>
           <p:cNvPicPr preferRelativeResize="0"/>
           <p:nvPr/>
         </p:nvPicPr>
@@ -11578,7 +14453,7 @@
         </p:blipFill>
         <p:spPr>
           <a:xfrm>
-            <a:off x="-26600" y="123000"/>
+            <a:off x="125800" y="123000"/>
             <a:ext cx="2798947" cy="2595100"/>
           </a:xfrm>
           <a:prstGeom prst="rect">
@@ -11592,13 +14467,13 @@
       </p:pic>
       <p:sp>
         <p:nvSpPr>
-          <p:cNvPr id="87" name="Google Shape;87;p13"/>
+          <p:cNvPr id="107" name="Google Shape;107;p16"/>
           <p:cNvSpPr txBox="1"/>
           <p:nvPr/>
         </p:nvSpPr>
         <p:spPr>
           <a:xfrm>
-            <a:off x="2942388" y="1411888"/>
+            <a:off x="3094788" y="1411888"/>
             <a:ext cx="3610200" cy="877200"/>
           </a:xfrm>
           <a:prstGeom prst="rect">
@@ -11730,7 +14605,7 @@
       </p:sp>
       <p:pic>
         <p:nvPicPr>
-          <p:cNvPr id="88" name="Google Shape;88;p13"/>
+          <p:cNvPr id="108" name="Google Shape;108;p16"/>
           <p:cNvPicPr preferRelativeResize="0"/>
           <p:nvPr/>
         </p:nvPicPr>
@@ -11743,7 +14618,7 @@
         </p:blipFill>
         <p:spPr>
           <a:xfrm>
-            <a:off x="2783463" y="4092801"/>
+            <a:off x="2935863" y="4092801"/>
             <a:ext cx="3928048" cy="1414425"/>
           </a:xfrm>
           <a:prstGeom prst="rect">
@@ -11757,7 +14632,7 @@
       </p:pic>
       <p:pic>
         <p:nvPicPr>
-          <p:cNvPr id="89" name="Google Shape;89;p13"/>
+          <p:cNvPr id="109" name="Google Shape;109;p16"/>
           <p:cNvPicPr preferRelativeResize="0"/>
           <p:nvPr/>
         </p:nvPicPr>
@@ -11770,7 +14645,7 @@
         </p:blipFill>
         <p:spPr>
           <a:xfrm>
-            <a:off x="559200" y="5471564"/>
+            <a:off x="711600" y="5471564"/>
             <a:ext cx="3928048" cy="1414425"/>
           </a:xfrm>
           <a:prstGeom prst="rect">
@@ -11784,7 +14659,7 @@
       </p:pic>
       <p:pic>
         <p:nvPicPr>
-          <p:cNvPr id="90" name="Google Shape;90;p13"/>
+          <p:cNvPr id="110" name="Google Shape;110;p16"/>
           <p:cNvPicPr preferRelativeResize="0"/>
           <p:nvPr/>
         </p:nvPicPr>
@@ -11797,7 +14672,7 @@
         </p:blipFill>
         <p:spPr>
           <a:xfrm>
-            <a:off x="559188" y="2682664"/>
+            <a:off x="711588" y="2682664"/>
             <a:ext cx="3928048" cy="1414425"/>
           </a:xfrm>
           <a:prstGeom prst="rect">
@@ -11811,7 +14686,7 @@
       </p:pic>
       <p:pic>
         <p:nvPicPr>
-          <p:cNvPr id="91" name="Google Shape;91;p13"/>
+          <p:cNvPr id="111" name="Google Shape;111;p16"/>
           <p:cNvPicPr preferRelativeResize="0"/>
           <p:nvPr/>
         </p:nvPicPr>
@@ -11824,7 +14699,7 @@
         </p:blipFill>
         <p:spPr>
           <a:xfrm>
-            <a:off x="2783463" y="6874401"/>
+            <a:off x="2935863" y="6874401"/>
             <a:ext cx="3928048" cy="1414425"/>
           </a:xfrm>
           <a:prstGeom prst="rect">
@@ -11838,7 +14713,7 @@
       </p:pic>
       <p:pic>
         <p:nvPicPr>
-          <p:cNvPr id="92" name="Google Shape;92;p13"/>
+          <p:cNvPr id="112" name="Google Shape;112;p16"/>
           <p:cNvPicPr preferRelativeResize="0"/>
           <p:nvPr/>
         </p:nvPicPr>
@@ -11851,7 +14726,7 @@
         </p:blipFill>
         <p:spPr>
           <a:xfrm>
-            <a:off x="559200" y="8293151"/>
+            <a:off x="711600" y="8293151"/>
             <a:ext cx="3928048" cy="1414425"/>
           </a:xfrm>
           <a:prstGeom prst="rect">
@@ -11865,13 +14740,13 @@
       </p:pic>
       <p:sp>
         <p:nvSpPr>
-          <p:cNvPr id="93" name="Google Shape;93;p13"/>
+          <p:cNvPr id="113" name="Google Shape;113;p16"/>
           <p:cNvSpPr txBox="1"/>
           <p:nvPr/>
         </p:nvSpPr>
         <p:spPr>
           <a:xfrm>
-            <a:off x="798363" y="2799038"/>
+            <a:off x="950763" y="2799038"/>
             <a:ext cx="3449700" cy="1181700"/>
           </a:xfrm>
           <a:prstGeom prst="rect">
@@ -11998,13 +14873,13 @@
       </p:sp>
       <p:sp>
         <p:nvSpPr>
-          <p:cNvPr id="94" name="Google Shape;94;p13"/>
+          <p:cNvPr id="114" name="Google Shape;114;p16"/>
           <p:cNvSpPr txBox="1"/>
           <p:nvPr/>
         </p:nvSpPr>
         <p:spPr>
           <a:xfrm>
-            <a:off x="3022638" y="4193388"/>
+            <a:off x="3175038" y="4193388"/>
             <a:ext cx="3449700" cy="1181700"/>
           </a:xfrm>
           <a:prstGeom prst="rect">
@@ -12143,13 +15018,13 @@
       </p:sp>
       <p:sp>
         <p:nvSpPr>
-          <p:cNvPr id="95" name="Google Shape;95;p13"/>
+          <p:cNvPr id="115" name="Google Shape;115;p16"/>
           <p:cNvSpPr txBox="1"/>
           <p:nvPr/>
         </p:nvSpPr>
         <p:spPr>
           <a:xfrm>
-            <a:off x="798375" y="5587913"/>
+            <a:off x="950775" y="5587913"/>
             <a:ext cx="3449700" cy="1181700"/>
           </a:xfrm>
           <a:prstGeom prst="rect">
@@ -12288,13 +15163,13 @@
       </p:sp>
       <p:sp>
         <p:nvSpPr>
-          <p:cNvPr id="96" name="Google Shape;96;p13"/>
+          <p:cNvPr id="116" name="Google Shape;116;p16"/>
           <p:cNvSpPr txBox="1"/>
           <p:nvPr/>
         </p:nvSpPr>
         <p:spPr>
           <a:xfrm>
-            <a:off x="3022625" y="6990750"/>
+            <a:off x="3175025" y="6990750"/>
             <a:ext cx="3449700" cy="1181700"/>
           </a:xfrm>
           <a:prstGeom prst="rect">
@@ -12433,13 +15308,13 @@
       </p:sp>
       <p:sp>
         <p:nvSpPr>
-          <p:cNvPr id="97" name="Google Shape;97;p13"/>
+          <p:cNvPr id="117" name="Google Shape;117;p16"/>
           <p:cNvSpPr txBox="1"/>
           <p:nvPr/>
         </p:nvSpPr>
         <p:spPr>
           <a:xfrm>
-            <a:off x="798363" y="8409538"/>
+            <a:off x="950763" y="8409538"/>
             <a:ext cx="3449700" cy="1181700"/>
           </a:xfrm>
           <a:prstGeom prst="rect">
@@ -12578,7 +15453,7 @@
       </p:sp>
       <p:pic>
         <p:nvPicPr>
-          <p:cNvPr id="98" name="Google Shape;98;p13"/>
+          <p:cNvPr id="118" name="Google Shape;118;p16"/>
           <p:cNvPicPr preferRelativeResize="0"/>
           <p:nvPr/>
         </p:nvPicPr>
@@ -12592,7 +15467,7 @@
         </p:blipFill>
         <p:spPr>
           <a:xfrm>
-            <a:off x="4886274" y="8056772"/>
+            <a:off x="5038674" y="8056772"/>
             <a:ext cx="1990876" cy="1887250"/>
           </a:xfrm>
           <a:prstGeom prst="rect">
@@ -12606,7 +15481,7 @@
       </p:pic>
       <p:pic>
         <p:nvPicPr>
-          <p:cNvPr id="99" name="Google Shape;99;p13"/>
+          <p:cNvPr id="119" name="Google Shape;119;p16"/>
           <p:cNvPicPr preferRelativeResize="0"/>
           <p:nvPr/>
         </p:nvPicPr>
@@ -12634,7 +15509,7 @@
       </p:pic>
       <p:pic>
         <p:nvPicPr>
-          <p:cNvPr id="100" name="Google Shape;100;p13"/>
+          <p:cNvPr id="120" name="Google Shape;120;p16"/>
           <p:cNvPicPr preferRelativeResize="0"/>
           <p:nvPr/>
         </p:nvPicPr>
@@ -12662,7 +15537,7 @@
       </p:pic>
       <p:pic>
         <p:nvPicPr>
-          <p:cNvPr id="101" name="Google Shape;101;p13"/>
+          <p:cNvPr id="121" name="Google Shape;121;p16"/>
           <p:cNvPicPr preferRelativeResize="0"/>
           <p:nvPr/>
         </p:nvPicPr>
@@ -12690,7 +15565,7 @@
       </p:pic>
       <p:pic>
         <p:nvPicPr>
-          <p:cNvPr id="102" name="Google Shape;102;p13"/>
+          <p:cNvPr id="122" name="Google Shape;122;p16"/>
           <p:cNvPicPr preferRelativeResize="0"/>
           <p:nvPr/>
         </p:nvPicPr>
@@ -12724,12 +15599,12 @@
 </p:sld>
 </file>
 
-<file path=ppt/slides/slide2.xml><?xml version="1.0" encoding="utf-8"?>
+<file path=ppt/slides/slide5.xml><?xml version="1.0" encoding="utf-8"?>
 <p:sld xmlns:a="http://schemas.openxmlformats.org/drawingml/2006/main" xmlns:r="http://schemas.openxmlformats.org/officeDocument/2006/relationships" xmlns:mc="http://schemas.openxmlformats.org/markup-compatibility/2006" xmlns:mv="urn:schemas-microsoft-com:mac:vml" xmlns:p="http://schemas.openxmlformats.org/presentationml/2006/main" xmlns:c="http://schemas.openxmlformats.org/drawingml/2006/chart" xmlns:dgm="http://schemas.openxmlformats.org/drawingml/2006/diagram" xmlns:o="urn:schemas-microsoft-com:office:office" xmlns:v="urn:schemas-microsoft-com:vml" xmlns:pvml="urn:schemas-microsoft-com:office:powerpoint" xmlns:com="http://schemas.openxmlformats.org/drawingml/2006/compatibility" xmlns:p14="http://schemas.microsoft.com/office/powerpoint/2010/main" xmlns:p15="http://schemas.microsoft.com/office/powerpoint/2012/main">
   <p:cSld>
     <p:spTree>
       <p:nvGrpSpPr>
-        <p:cNvPr id="106" name="Shape 106"/>
+        <p:cNvPr id="126" name="Shape 126"/>
         <p:cNvGrpSpPr/>
         <p:nvPr/>
       </p:nvGrpSpPr>
@@ -12743,7 +15618,7 @@
       </p:grpSpPr>
       <p:pic>
         <p:nvPicPr>
-          <p:cNvPr id="107" name="Google Shape;107;p14"/>
+          <p:cNvPr id="127" name="Google Shape;127;p17"/>
           <p:cNvPicPr preferRelativeResize="0"/>
           <p:nvPr/>
         </p:nvPicPr>
@@ -12770,7 +15645,7 @@
       </p:pic>
       <p:pic>
         <p:nvPicPr>
-          <p:cNvPr id="108" name="Google Shape;108;p14"/>
+          <p:cNvPr id="128" name="Google Shape;128;p17"/>
           <p:cNvPicPr preferRelativeResize="0"/>
           <p:nvPr/>
         </p:nvPicPr>
@@ -12797,7 +15672,7 @@
       </p:pic>
       <p:pic>
         <p:nvPicPr>
-          <p:cNvPr id="109" name="Google Shape;109;p14"/>
+          <p:cNvPr id="129" name="Google Shape;129;p17"/>
           <p:cNvPicPr preferRelativeResize="0"/>
           <p:nvPr/>
         </p:nvPicPr>
@@ -12824,7 +15699,7 @@
       </p:pic>
       <p:sp>
         <p:nvSpPr>
-          <p:cNvPr id="110" name="Google Shape;110;p14"/>
+          <p:cNvPr id="130" name="Google Shape;130;p17"/>
           <p:cNvSpPr txBox="1"/>
           <p:nvPr/>
         </p:nvSpPr>
@@ -12876,7 +15751,7 @@
       </p:sp>
       <p:sp>
         <p:nvSpPr>
-          <p:cNvPr id="111" name="Google Shape;111;p14"/>
+          <p:cNvPr id="131" name="Google Shape;131;p17"/>
           <p:cNvSpPr txBox="1"/>
           <p:nvPr/>
         </p:nvSpPr>
@@ -12926,7 +15801,7 @@
       </p:sp>
       <p:pic>
         <p:nvPicPr>
-          <p:cNvPr id="112" name="Google Shape;112;p14"/>
+          <p:cNvPr id="132" name="Google Shape;132;p17"/>
           <p:cNvPicPr preferRelativeResize="0"/>
           <p:nvPr/>
         </p:nvPicPr>
@@ -12953,7 +15828,7 @@
       </p:pic>
       <p:sp>
         <p:nvSpPr>
-          <p:cNvPr id="113" name="Google Shape;113;p14"/>
+          <p:cNvPr id="133" name="Google Shape;133;p17"/>
           <p:cNvSpPr txBox="1"/>
           <p:nvPr/>
         </p:nvSpPr>
@@ -13015,7 +15890,7 @@
       </p:sp>
       <p:sp>
         <p:nvSpPr>
-          <p:cNvPr id="114" name="Google Shape;114;p14"/>
+          <p:cNvPr id="134" name="Google Shape;134;p17"/>
           <p:cNvSpPr txBox="1"/>
           <p:nvPr/>
         </p:nvSpPr>
@@ -13065,7 +15940,7 @@
       </p:sp>
       <p:pic>
         <p:nvPicPr>
-          <p:cNvPr id="115" name="Google Shape;115;p14"/>
+          <p:cNvPr id="135" name="Google Shape;135;p17"/>
           <p:cNvPicPr preferRelativeResize="0"/>
           <p:nvPr/>
         </p:nvPicPr>
@@ -13092,7 +15967,7 @@
       </p:pic>
       <p:sp>
         <p:nvSpPr>
-          <p:cNvPr id="116" name="Google Shape;116;p14"/>
+          <p:cNvPr id="136" name="Google Shape;136;p17"/>
           <p:cNvSpPr txBox="1"/>
           <p:nvPr/>
         </p:nvSpPr>
@@ -13142,7 +16017,7 @@
       </p:sp>
       <p:pic>
         <p:nvPicPr>
-          <p:cNvPr id="117" name="Google Shape;117;p14"/>
+          <p:cNvPr id="137" name="Google Shape;137;p17"/>
           <p:cNvPicPr preferRelativeResize="0"/>
           <p:nvPr/>
         </p:nvPicPr>
@@ -13169,7 +16044,7 @@
       </p:pic>
       <p:sp>
         <p:nvSpPr>
-          <p:cNvPr id="118" name="Google Shape;118;p14"/>
+          <p:cNvPr id="138" name="Google Shape;138;p17"/>
           <p:cNvSpPr txBox="1"/>
           <p:nvPr/>
         </p:nvSpPr>
@@ -13219,7 +16094,7 @@
       </p:sp>
       <p:cxnSp>
         <p:nvCxnSpPr>
-          <p:cNvPr id="119" name="Google Shape;119;p14"/>
+          <p:cNvPr id="139" name="Google Shape;139;p17"/>
           <p:cNvCxnSpPr/>
           <p:nvPr/>
         </p:nvCxnSpPr>
@@ -13245,7 +16120,7 @@
       </p:cxnSp>
       <p:sp>
         <p:nvSpPr>
-          <p:cNvPr id="120" name="Google Shape;120;p14"/>
+          <p:cNvPr id="140" name="Google Shape;140;p17"/>
           <p:cNvSpPr txBox="1"/>
           <p:nvPr/>
         </p:nvSpPr>
@@ -13303,7 +16178,7 @@
       </p:sp>
       <p:sp>
         <p:nvSpPr>
-          <p:cNvPr id="121" name="Google Shape;121;p14"/>
+          <p:cNvPr id="141" name="Google Shape;141;p17"/>
           <p:cNvSpPr txBox="1"/>
           <p:nvPr/>
         </p:nvSpPr>
@@ -13361,12 +16236,12 @@
 </p:sld>
 </file>
 
-<file path=ppt/slides/slide3.xml><?xml version="1.0" encoding="utf-8"?>
+<file path=ppt/slides/slide6.xml><?xml version="1.0" encoding="utf-8"?>
 <p:sld xmlns:a="http://schemas.openxmlformats.org/drawingml/2006/main" xmlns:r="http://schemas.openxmlformats.org/officeDocument/2006/relationships" xmlns:mc="http://schemas.openxmlformats.org/markup-compatibility/2006" xmlns:mv="urn:schemas-microsoft-com:mac:vml" xmlns:p="http://schemas.openxmlformats.org/presentationml/2006/main" xmlns:c="http://schemas.openxmlformats.org/drawingml/2006/chart" xmlns:dgm="http://schemas.openxmlformats.org/drawingml/2006/diagram" xmlns:o="urn:schemas-microsoft-com:office:office" xmlns:v="urn:schemas-microsoft-com:vml" xmlns:pvml="urn:schemas-microsoft-com:office:powerpoint" xmlns:com="http://schemas.openxmlformats.org/drawingml/2006/compatibility" xmlns:p14="http://schemas.microsoft.com/office/powerpoint/2010/main" xmlns:p15="http://schemas.microsoft.com/office/powerpoint/2012/main">
   <p:cSld>
     <p:spTree>
       <p:nvGrpSpPr>
-        <p:cNvPr id="125" name="Shape 125"/>
+        <p:cNvPr id="145" name="Shape 145"/>
         <p:cNvGrpSpPr/>
         <p:nvPr/>
       </p:nvGrpSpPr>
@@ -13380,7 +16255,7 @@
       </p:grpSpPr>
       <p:pic>
         <p:nvPicPr>
-          <p:cNvPr id="126" name="Google Shape;126;p15"/>
+          <p:cNvPr id="146" name="Google Shape;146;p18"/>
           <p:cNvPicPr preferRelativeResize="0"/>
           <p:nvPr/>
         </p:nvPicPr>
@@ -13407,7 +16282,7 @@
       </p:pic>
       <p:pic>
         <p:nvPicPr>
-          <p:cNvPr id="127" name="Google Shape;127;p15"/>
+          <p:cNvPr id="147" name="Google Shape;147;p18"/>
           <p:cNvPicPr preferRelativeResize="0"/>
           <p:nvPr/>
         </p:nvPicPr>
@@ -13434,7 +16309,7 @@
       </p:pic>
       <p:pic>
         <p:nvPicPr>
-          <p:cNvPr id="128" name="Google Shape;128;p15"/>
+          <p:cNvPr id="148" name="Google Shape;148;p18"/>
           <p:cNvPicPr preferRelativeResize="0"/>
           <p:nvPr/>
         </p:nvPicPr>
@@ -13461,7 +16336,7 @@
       </p:pic>
       <p:sp>
         <p:nvSpPr>
-          <p:cNvPr id="129" name="Google Shape;129;p15"/>
+          <p:cNvPr id="149" name="Google Shape;149;p18"/>
           <p:cNvSpPr txBox="1"/>
           <p:nvPr/>
         </p:nvSpPr>
@@ -13513,7 +16388,7 @@
       </p:sp>
       <p:sp>
         <p:nvSpPr>
-          <p:cNvPr id="130" name="Google Shape;130;p15"/>
+          <p:cNvPr id="150" name="Google Shape;150;p18"/>
           <p:cNvSpPr txBox="1"/>
           <p:nvPr/>
         </p:nvSpPr>
@@ -13575,7 +16450,7 @@
       </p:sp>
       <p:pic>
         <p:nvPicPr>
-          <p:cNvPr id="131" name="Google Shape;131;p15"/>
+          <p:cNvPr id="151" name="Google Shape;151;p18"/>
           <p:cNvPicPr preferRelativeResize="0"/>
           <p:nvPr/>
         </p:nvPicPr>
@@ -13602,7 +16477,7 @@
       </p:pic>
       <p:sp>
         <p:nvSpPr>
-          <p:cNvPr id="132" name="Google Shape;132;p15"/>
+          <p:cNvPr id="152" name="Google Shape;152;p18"/>
           <p:cNvSpPr txBox="1"/>
           <p:nvPr/>
         </p:nvSpPr>
@@ -13664,7 +16539,7 @@
       </p:sp>
       <p:sp>
         <p:nvSpPr>
-          <p:cNvPr id="133" name="Google Shape;133;p15"/>
+          <p:cNvPr id="153" name="Google Shape;153;p18"/>
           <p:cNvSpPr txBox="1"/>
           <p:nvPr/>
         </p:nvSpPr>
@@ -13705,7 +16580,7 @@
       </p:sp>
       <p:cxnSp>
         <p:nvCxnSpPr>
-          <p:cNvPr id="134" name="Google Shape;134;p15"/>
+          <p:cNvPr id="154" name="Google Shape;154;p18"/>
           <p:cNvCxnSpPr/>
           <p:nvPr/>
         </p:nvCxnSpPr>
@@ -13731,7 +16606,7 @@
       </p:cxnSp>
       <p:sp>
         <p:nvSpPr>
-          <p:cNvPr id="135" name="Google Shape;135;p15"/>
+          <p:cNvPr id="155" name="Google Shape;155;p18"/>
           <p:cNvSpPr txBox="1"/>
           <p:nvPr/>
         </p:nvSpPr>
@@ -13781,7 +16656,7 @@
       </p:sp>
       <p:sp>
         <p:nvSpPr>
-          <p:cNvPr id="136" name="Google Shape;136;p15"/>
+          <p:cNvPr id="156" name="Google Shape;156;p18"/>
           <p:cNvSpPr txBox="1"/>
           <p:nvPr/>
         </p:nvSpPr>
@@ -13835,7 +16710,7 @@
       </p:sp>
       <p:cxnSp>
         <p:nvCxnSpPr>
-          <p:cNvPr id="137" name="Google Shape;137;p15"/>
+          <p:cNvPr id="157" name="Google Shape;157;p18"/>
           <p:cNvCxnSpPr/>
           <p:nvPr/>
         </p:nvCxnSpPr>
@@ -13867,12 +16742,12 @@
 </p:sld>
 </file>
 
-<file path=ppt/slides/slide4.xml><?xml version="1.0" encoding="utf-8"?>
+<file path=ppt/slides/slide7.xml><?xml version="1.0" encoding="utf-8"?>
 <p:sld xmlns:a="http://schemas.openxmlformats.org/drawingml/2006/main" xmlns:r="http://schemas.openxmlformats.org/officeDocument/2006/relationships" xmlns:mc="http://schemas.openxmlformats.org/markup-compatibility/2006" xmlns:mv="urn:schemas-microsoft-com:mac:vml" xmlns:p="http://schemas.openxmlformats.org/presentationml/2006/main" xmlns:c="http://schemas.openxmlformats.org/drawingml/2006/chart" xmlns:dgm="http://schemas.openxmlformats.org/drawingml/2006/diagram" xmlns:o="urn:schemas-microsoft-com:office:office" xmlns:v="urn:schemas-microsoft-com:vml" xmlns:pvml="urn:schemas-microsoft-com:office:powerpoint" xmlns:com="http://schemas.openxmlformats.org/drawingml/2006/compatibility" xmlns:p14="http://schemas.microsoft.com/office/powerpoint/2010/main" xmlns:p15="http://schemas.microsoft.com/office/powerpoint/2012/main">
   <p:cSld>
     <p:spTree>
       <p:nvGrpSpPr>
-        <p:cNvPr id="141" name="Shape 141"/>
+        <p:cNvPr id="161" name="Shape 161"/>
         <p:cNvGrpSpPr/>
         <p:nvPr/>
       </p:nvGrpSpPr>
@@ -13886,7 +16761,7 @@
       </p:grpSpPr>
       <p:pic>
         <p:nvPicPr>
-          <p:cNvPr id="142" name="Google Shape;142;p16"/>
+          <p:cNvPr id="162" name="Google Shape;162;p19"/>
           <p:cNvPicPr preferRelativeResize="0"/>
           <p:nvPr/>
         </p:nvPicPr>
@@ -13913,7 +16788,7 @@
       </p:pic>
       <p:sp>
         <p:nvSpPr>
-          <p:cNvPr id="143" name="Google Shape;143;p16"/>
+          <p:cNvPr id="163" name="Google Shape;163;p19"/>
           <p:cNvSpPr txBox="1"/>
           <p:nvPr/>
         </p:nvSpPr>
@@ -13975,7 +16850,7 @@
       </p:sp>
       <p:sp>
         <p:nvSpPr>
-          <p:cNvPr id="144" name="Google Shape;144;p16"/>
+          <p:cNvPr id="164" name="Google Shape;164;p19"/>
           <p:cNvSpPr txBox="1"/>
           <p:nvPr/>
         </p:nvSpPr>
@@ -14025,7 +16900,7 @@
       </p:sp>
       <p:cxnSp>
         <p:nvCxnSpPr>
-          <p:cNvPr id="145" name="Google Shape;145;p16"/>
+          <p:cNvPr id="165" name="Google Shape;165;p19"/>
           <p:cNvCxnSpPr/>
           <p:nvPr/>
         </p:nvCxnSpPr>
@@ -14051,7 +16926,7 @@
       </p:cxnSp>
       <p:sp>
         <p:nvSpPr>
-          <p:cNvPr id="146" name="Google Shape;146;p16"/>
+          <p:cNvPr id="166" name="Google Shape;166;p19"/>
           <p:cNvSpPr txBox="1"/>
           <p:nvPr/>
         </p:nvSpPr>
@@ -14121,7 +16996,7 @@
       </p:sp>
       <p:pic>
         <p:nvPicPr>
-          <p:cNvPr id="147" name="Google Shape;147;p16"/>
+          <p:cNvPr id="167" name="Google Shape;167;p19"/>
           <p:cNvPicPr preferRelativeResize="0"/>
           <p:nvPr/>
         </p:nvPicPr>
@@ -14148,7 +17023,7 @@
       </p:pic>
       <p:pic>
         <p:nvPicPr>
-          <p:cNvPr id="148" name="Google Shape;148;p16"/>
+          <p:cNvPr id="168" name="Google Shape;168;p19"/>
           <p:cNvPicPr preferRelativeResize="0"/>
           <p:nvPr/>
         </p:nvPicPr>
@@ -14175,7 +17050,7 @@
       </p:pic>
       <p:sp>
         <p:nvSpPr>
-          <p:cNvPr id="149" name="Google Shape;149;p16"/>
+          <p:cNvPr id="169" name="Google Shape;169;p19"/>
           <p:cNvSpPr txBox="1"/>
           <p:nvPr/>
         </p:nvSpPr>
@@ -14225,7 +17100,7 @@
       </p:sp>
       <p:sp>
         <p:nvSpPr>
-          <p:cNvPr id="150" name="Google Shape;150;p16"/>
+          <p:cNvPr id="170" name="Google Shape;170;p19"/>
           <p:cNvSpPr txBox="1"/>
           <p:nvPr/>
         </p:nvSpPr>
@@ -14275,7 +17150,7 @@
       </p:sp>
       <p:pic>
         <p:nvPicPr>
-          <p:cNvPr id="151" name="Google Shape;151;p16"/>
+          <p:cNvPr id="171" name="Google Shape;171;p19"/>
           <p:cNvPicPr preferRelativeResize="0"/>
           <p:nvPr/>
         </p:nvPicPr>
@@ -14302,7 +17177,7 @@
       </p:pic>
       <p:sp>
         <p:nvSpPr>
-          <p:cNvPr id="152" name="Google Shape;152;p16"/>
+          <p:cNvPr id="172" name="Google Shape;172;p19"/>
           <p:cNvSpPr txBox="1"/>
           <p:nvPr/>
         </p:nvSpPr>
@@ -14426,12 +17301,12 @@
 </p:sld>
 </file>
 
-<file path=ppt/slides/slide5.xml><?xml version="1.0" encoding="utf-8"?>
+<file path=ppt/slides/slide8.xml><?xml version="1.0" encoding="utf-8"?>
 <p:sld xmlns:a="http://schemas.openxmlformats.org/drawingml/2006/main" xmlns:r="http://schemas.openxmlformats.org/officeDocument/2006/relationships" xmlns:mc="http://schemas.openxmlformats.org/markup-compatibility/2006" xmlns:mv="urn:schemas-microsoft-com:mac:vml" xmlns:p="http://schemas.openxmlformats.org/presentationml/2006/main" xmlns:c="http://schemas.openxmlformats.org/drawingml/2006/chart" xmlns:dgm="http://schemas.openxmlformats.org/drawingml/2006/diagram" xmlns:o="urn:schemas-microsoft-com:office:office" xmlns:v="urn:schemas-microsoft-com:vml" xmlns:pvml="urn:schemas-microsoft-com:office:powerpoint" xmlns:com="http://schemas.openxmlformats.org/drawingml/2006/compatibility" xmlns:p14="http://schemas.microsoft.com/office/powerpoint/2010/main" xmlns:p15="http://schemas.microsoft.com/office/powerpoint/2012/main">
   <p:cSld>
     <p:spTree>
       <p:nvGrpSpPr>
-        <p:cNvPr id="156" name="Shape 156"/>
+        <p:cNvPr id="176" name="Shape 176"/>
         <p:cNvGrpSpPr/>
         <p:nvPr/>
       </p:nvGrpSpPr>
@@ -14445,21 +17320,22 @@
       </p:grpSpPr>
       <p:pic>
         <p:nvPicPr>
-          <p:cNvPr id="157" name="Google Shape;157;p17"/>
+          <p:cNvPr id="177" name="Google Shape;177;p20"/>
           <p:cNvPicPr preferRelativeResize="0"/>
           <p:nvPr/>
         </p:nvPicPr>
-        <p:blipFill rotWithShape="1">
+        <p:blipFill>
           <a:blip r:embed="rId3">
             <a:alphaModFix/>
           </a:blip>
-          <a:srcRect b="0" l="-2312" r="0" t="0"/>
-          <a:stretch/>
+          <a:stretch>
+            <a:fillRect/>
+          </a:stretch>
         </p:blipFill>
         <p:spPr>
           <a:xfrm>
-            <a:off x="74488" y="743050"/>
-            <a:ext cx="7410698" cy="6871001"/>
+            <a:off x="-91746" y="116478"/>
+            <a:ext cx="7564649" cy="10674544"/>
           </a:xfrm>
           <a:prstGeom prst="rect">
             <a:avLst/>
@@ -14470,14 +17346,93 @@
           </a:ln>
         </p:spPr>
       </p:pic>
+      <p:sp>
+        <p:nvSpPr>
+          <p:cNvPr id="178" name="Google Shape;178;p20"/>
+          <p:cNvSpPr txBox="1"/>
+          <p:nvPr/>
+        </p:nvSpPr>
+        <p:spPr>
+          <a:xfrm>
+            <a:off x="493100" y="343425"/>
+            <a:ext cx="6210300" cy="550200"/>
+          </a:xfrm>
+          <a:prstGeom prst="rect">
+            <a:avLst/>
+          </a:prstGeom>
+          <a:noFill/>
+          <a:ln>
+            <a:noFill/>
+          </a:ln>
+        </p:spPr>
+        <p:txBody>
+          <a:bodyPr anchorCtr="0" anchor="t" bIns="91425" lIns="91425" spcFirstLastPara="1" rIns="91425" wrap="square" tIns="91425">
+            <a:noAutofit/>
+          </a:bodyPr>
+          <a:lstStyle/>
+          <a:p>
+            <a:pPr indent="0" lvl="0" marL="0" rtl="0" algn="l">
+              <a:spcBef>
+                <a:spcPts val="0"/>
+              </a:spcBef>
+              <a:spcAft>
+                <a:spcPts val="0"/>
+              </a:spcAft>
+              <a:buNone/>
+            </a:pPr>
+            <a:r>
+              <a:rPr b="1" lang="nl-NL" sz="3600">
+                <a:solidFill>
+                  <a:srgbClr val="575656"/>
+                </a:solidFill>
+                <a:latin typeface="Ubuntu"/>
+                <a:ea typeface="Ubuntu"/>
+                <a:cs typeface="Ubuntu"/>
+                <a:sym typeface="Ubuntu"/>
+              </a:rPr>
+              <a:t>Notities en Opmerkingen</a:t>
+            </a:r>
+            <a:endParaRPr sz="3600">
+              <a:solidFill>
+                <a:srgbClr val="575656"/>
+              </a:solidFill>
+            </a:endParaRPr>
+          </a:p>
+        </p:txBody>
+      </p:sp>
+    </p:spTree>
+  </p:cSld>
+  <p:clrMapOvr>
+    <a:masterClrMapping/>
+  </p:clrMapOvr>
+</p:sld>
+</file>
+
+<file path=ppt/slides/slide9.xml><?xml version="1.0" encoding="utf-8"?>
+<p:sld xmlns:a="http://schemas.openxmlformats.org/drawingml/2006/main" xmlns:r="http://schemas.openxmlformats.org/officeDocument/2006/relationships" xmlns:mc="http://schemas.openxmlformats.org/markup-compatibility/2006" xmlns:mv="urn:schemas-microsoft-com:mac:vml" xmlns:p="http://schemas.openxmlformats.org/presentationml/2006/main" xmlns:c="http://schemas.openxmlformats.org/drawingml/2006/chart" xmlns:dgm="http://schemas.openxmlformats.org/drawingml/2006/diagram" xmlns:o="urn:schemas-microsoft-com:office:office" xmlns:v="urn:schemas-microsoft-com:vml" xmlns:pvml="urn:schemas-microsoft-com:office:powerpoint" xmlns:com="http://schemas.openxmlformats.org/drawingml/2006/compatibility" xmlns:p14="http://schemas.microsoft.com/office/powerpoint/2010/main" xmlns:p15="http://schemas.microsoft.com/office/powerpoint/2012/main">
+  <p:cSld>
+    <p:spTree>
+      <p:nvGrpSpPr>
+        <p:cNvPr id="182" name="Shape 182"/>
+        <p:cNvGrpSpPr/>
+        <p:nvPr/>
+      </p:nvGrpSpPr>
+      <p:grpSpPr>
+        <a:xfrm>
+          <a:off x="0" y="0"/>
+          <a:ext cx="0" cy="0"/>
+          <a:chOff x="0" y="0"/>
+          <a:chExt cx="0" cy="0"/>
+        </a:xfrm>
+      </p:grpSpPr>
       <p:pic>
         <p:nvPicPr>
-          <p:cNvPr id="158" name="Google Shape;158;p17"/>
+          <p:cNvPr id="183" name="Google Shape;183;p21"/>
           <p:cNvPicPr preferRelativeResize="0"/>
           <p:nvPr/>
         </p:nvPicPr>
         <p:blipFill>
-          <a:blip r:embed="rId4">
+          <a:blip r:embed="rId3">
             <a:alphaModFix/>
           </a:blip>
           <a:stretch>
@@ -14486,8 +17441,8 @@
         </p:blipFill>
         <p:spPr>
           <a:xfrm>
-            <a:off x="381012" y="9591076"/>
-            <a:ext cx="1486975" cy="461599"/>
+            <a:off x="-91746" y="116478"/>
+            <a:ext cx="7564649" cy="10674544"/>
           </a:xfrm>
           <a:prstGeom prst="rect">
             <a:avLst/>
@@ -14498,23 +17453,16 @@
           </a:ln>
         </p:spPr>
       </p:pic>
-      <p:pic>
-        <p:nvPicPr>
-          <p:cNvPr id="159" name="Google Shape;159;p17"/>
-          <p:cNvPicPr preferRelativeResize="0"/>
+      <p:sp>
+        <p:nvSpPr>
+          <p:cNvPr id="184" name="Google Shape;184;p21"/>
+          <p:cNvSpPr txBox="1"/>
           <p:nvPr/>
-        </p:nvPicPr>
-        <p:blipFill rotWithShape="1">
-          <a:blip r:embed="rId5">
-            <a:alphaModFix/>
-          </a:blip>
-          <a:srcRect b="0" l="21521" r="13361" t="7715"/>
-          <a:stretch/>
-        </p:blipFill>
+        </p:nvSpPr>
         <p:spPr>
           <a:xfrm>
-            <a:off x="1879525" y="8451550"/>
-            <a:ext cx="1440699" cy="1935450"/>
+            <a:off x="493100" y="343425"/>
+            <a:ext cx="6210300" cy="550200"/>
           </a:xfrm>
           <a:prstGeom prst="rect">
             <a:avLst/>
@@ -14524,119 +17472,41 @@
             <a:noFill/>
           </a:ln>
         </p:spPr>
-      </p:pic>
-      <p:pic>
-        <p:nvPicPr>
-          <p:cNvPr id="160" name="Google Shape;160;p17"/>
-          <p:cNvPicPr preferRelativeResize="0"/>
-          <p:nvPr/>
-        </p:nvPicPr>
-        <p:blipFill>
-          <a:blip r:embed="rId6">
-            <a:alphaModFix/>
-          </a:blip>
-          <a:stretch>
-            <a:fillRect/>
-          </a:stretch>
-        </p:blipFill>
-        <p:spPr>
-          <a:xfrm>
-            <a:off x="5295150" y="8587065"/>
-            <a:ext cx="1736425" cy="728709"/>
-          </a:xfrm>
-          <a:prstGeom prst="rect">
-            <a:avLst/>
-          </a:prstGeom>
-          <a:noFill/>
-          <a:ln>
-            <a:noFill/>
-          </a:ln>
-        </p:spPr>
-      </p:pic>
-      <p:pic>
-        <p:nvPicPr>
-          <p:cNvPr id="161" name="Google Shape;161;p17"/>
-          <p:cNvPicPr preferRelativeResize="0"/>
-          <p:nvPr/>
-        </p:nvPicPr>
-        <p:blipFill>
-          <a:blip r:embed="rId7">
-            <a:alphaModFix/>
-          </a:blip>
-          <a:stretch>
-            <a:fillRect/>
-          </a:stretch>
-        </p:blipFill>
-        <p:spPr>
-          <a:xfrm>
-            <a:off x="3249361" y="8720624"/>
-            <a:ext cx="1736402" cy="461600"/>
-          </a:xfrm>
-          <a:prstGeom prst="rect">
-            <a:avLst/>
-          </a:prstGeom>
-          <a:noFill/>
-          <a:ln>
-            <a:noFill/>
-          </a:ln>
-        </p:spPr>
-      </p:pic>
-      <p:pic>
-        <p:nvPicPr>
-          <p:cNvPr id="162" name="Google Shape;162;p17"/>
-          <p:cNvPicPr preferRelativeResize="0"/>
-          <p:nvPr/>
-        </p:nvPicPr>
-        <p:blipFill>
-          <a:blip r:embed="rId8">
-            <a:alphaModFix/>
-          </a:blip>
-          <a:stretch>
-            <a:fillRect/>
-          </a:stretch>
-        </p:blipFill>
-        <p:spPr>
-          <a:xfrm>
-            <a:off x="3331750" y="9488488"/>
-            <a:ext cx="1571625" cy="666750"/>
-          </a:xfrm>
-          <a:prstGeom prst="rect">
-            <a:avLst/>
-          </a:prstGeom>
-          <a:noFill/>
-          <a:ln>
-            <a:noFill/>
-          </a:ln>
-        </p:spPr>
-      </p:pic>
-      <p:pic>
-        <p:nvPicPr>
-          <p:cNvPr id="163" name="Google Shape;163;p17"/>
-          <p:cNvPicPr preferRelativeResize="0"/>
-          <p:nvPr/>
-        </p:nvPicPr>
-        <p:blipFill>
-          <a:blip r:embed="rId9">
-            <a:alphaModFix/>
-          </a:blip>
-          <a:stretch>
-            <a:fillRect/>
-          </a:stretch>
-        </p:blipFill>
-        <p:spPr>
-          <a:xfrm>
-            <a:off x="5168025" y="9488500"/>
-            <a:ext cx="1990668" cy="461600"/>
-          </a:xfrm>
-          <a:prstGeom prst="rect">
-            <a:avLst/>
-          </a:prstGeom>
-          <a:noFill/>
-          <a:ln>
-            <a:noFill/>
-          </a:ln>
-        </p:spPr>
-      </p:pic>
+        <p:txBody>
+          <a:bodyPr anchorCtr="0" anchor="t" bIns="91425" lIns="91425" spcFirstLastPara="1" rIns="91425" wrap="square" tIns="91425">
+            <a:noAutofit/>
+          </a:bodyPr>
+          <a:lstStyle/>
+          <a:p>
+            <a:pPr indent="0" lvl="0" marL="0" rtl="0" algn="l">
+              <a:spcBef>
+                <a:spcPts val="0"/>
+              </a:spcBef>
+              <a:spcAft>
+                <a:spcPts val="0"/>
+              </a:spcAft>
+              <a:buNone/>
+            </a:pPr>
+            <a:r>
+              <a:rPr b="1" lang="nl-NL" sz="3600">
+                <a:solidFill>
+                  <a:srgbClr val="575656"/>
+                </a:solidFill>
+                <a:latin typeface="Ubuntu"/>
+                <a:ea typeface="Ubuntu"/>
+                <a:cs typeface="Ubuntu"/>
+                <a:sym typeface="Ubuntu"/>
+              </a:rPr>
+              <a:t>Notities en Opmerkingen</a:t>
+            </a:r>
+            <a:endParaRPr sz="3600">
+              <a:solidFill>
+                <a:srgbClr val="575656"/>
+              </a:solidFill>
+            </a:endParaRPr>
+          </a:p>
+        </p:txBody>
+      </p:sp>
     </p:spTree>
   </p:cSld>
   <p:clrMapOvr>

</xml_diff>